<commit_message>
almost all done now only readme.md left to finish - stop touching the webpage
</commit_message>
<xml_diff>
--- a/presentation/emm_jay.pptx
+++ b/presentation/emm_jay.pptx
@@ -10954,7 +10954,7 @@
                 <a:spcPct val="100000"/>
               </a:lnSpc>
             </a:pPr>
-            <a:fld id="{D18EC1DF-9882-4945-B2A1-1D03BF629EBB}" type="author">
+            <a:fld id="{16C8027C-9BFF-4E15-986D-9ABB1A49D4BE}" type="author">
               <a:rPr b="0" lang="en-AU" sz="1800" spc="-1" strike="noStrike">
                 <a:solidFill>
                   <a:srgbClr val="000000"/>
@@ -13986,7 +13986,7 @@
       </p:grpSpPr>
       <p:sp>
         <p:nvSpPr>
-          <p:cNvPr id="352" name="CustomShape 1"/>
+          <p:cNvPr id="356" name="CustomShape 1"/>
           <p:cNvSpPr/>
           <p:nvPr/>
         </p:nvSpPr>
@@ -14037,7 +14037,7 @@
       </p:sp>
       <p:sp>
         <p:nvSpPr>
-          <p:cNvPr id="353" name="CustomShape 2"/>
+          <p:cNvPr id="357" name="CustomShape 2"/>
           <p:cNvSpPr/>
           <p:nvPr/>
         </p:nvSpPr>
@@ -14063,7 +14063,7 @@
       </p:sp>
       <p:sp>
         <p:nvSpPr>
-          <p:cNvPr id="354" name="CustomShape 3"/>
+          <p:cNvPr id="358" name="CustomShape 3"/>
           <p:cNvSpPr/>
           <p:nvPr/>
         </p:nvSpPr>
@@ -14089,7 +14089,7 @@
       </p:sp>
       <p:pic>
         <p:nvPicPr>
-          <p:cNvPr id="355" name="" descr=""/>
+          <p:cNvPr id="359" name="" descr=""/>
           <p:cNvPicPr/>
           <p:nvPr/>
         </p:nvPicPr>
@@ -14112,7 +14112,7 @@
       </p:pic>
       <p:pic>
         <p:nvPicPr>
-          <p:cNvPr id="356" name="" descr=""/>
+          <p:cNvPr id="360" name="" descr=""/>
           <p:cNvPicPr/>
           <p:nvPr/>
         </p:nvPicPr>
@@ -14135,7 +14135,7 @@
       </p:pic>
       <p:sp>
         <p:nvSpPr>
-          <p:cNvPr id="357" name="CustomShape 4"/>
+          <p:cNvPr id="361" name="CustomShape 4"/>
           <p:cNvSpPr/>
           <p:nvPr/>
         </p:nvSpPr>
@@ -14316,7 +14316,7 @@
       </p:sp>
       <p:sp>
         <p:nvSpPr>
-          <p:cNvPr id="358" name="CustomShape 5"/>
+          <p:cNvPr id="362" name="CustomShape 5"/>
           <p:cNvSpPr/>
           <p:nvPr/>
         </p:nvSpPr>
@@ -14377,7 +14377,7 @@
       </p:sp>
       <p:sp>
         <p:nvSpPr>
-          <p:cNvPr id="359" name="CustomShape 6"/>
+          <p:cNvPr id="363" name="CustomShape 6"/>
           <p:cNvSpPr/>
           <p:nvPr/>
         </p:nvSpPr>
@@ -14480,7 +14480,7 @@
       </p:grpSpPr>
       <p:sp>
         <p:nvSpPr>
-          <p:cNvPr id="360" name="CustomShape 1"/>
+          <p:cNvPr id="364" name="CustomShape 1"/>
           <p:cNvSpPr/>
           <p:nvPr/>
         </p:nvSpPr>
@@ -14531,7 +14531,7 @@
       </p:sp>
       <p:sp>
         <p:nvSpPr>
-          <p:cNvPr id="361" name="CustomShape 2"/>
+          <p:cNvPr id="365" name="CustomShape 2"/>
           <p:cNvSpPr/>
           <p:nvPr/>
         </p:nvSpPr>
@@ -14557,7 +14557,7 @@
       </p:sp>
       <p:sp>
         <p:nvSpPr>
-          <p:cNvPr id="362" name="CustomShape 3"/>
+          <p:cNvPr id="366" name="CustomShape 3"/>
           <p:cNvSpPr/>
           <p:nvPr/>
         </p:nvSpPr>
@@ -14583,7 +14583,7 @@
       </p:sp>
       <p:pic>
         <p:nvPicPr>
-          <p:cNvPr id="363" name="" descr=""/>
+          <p:cNvPr id="367" name="" descr=""/>
           <p:cNvPicPr/>
           <p:nvPr/>
         </p:nvPicPr>
@@ -14606,7 +14606,7 @@
       </p:pic>
       <p:sp>
         <p:nvSpPr>
-          <p:cNvPr id="364" name="CustomShape 4"/>
+          <p:cNvPr id="368" name="CustomShape 4"/>
           <p:cNvSpPr/>
           <p:nvPr/>
         </p:nvSpPr>
@@ -14639,11 +14639,27 @@
                 <a:spcPct val="100000"/>
               </a:lnSpc>
             </a:pPr>
+            <a:endParaRPr b="0" lang="en-AU" sz="1800" spc="-1" strike="noStrike">
+              <a:latin typeface="Arial"/>
+            </a:endParaRPr>
+          </a:p>
+          <a:p>
+            <a:pPr>
+              <a:lnSpc>
+                <a:spcPct val="100000"/>
+              </a:lnSpc>
+            </a:pPr>
             <a:r>
               <a:rPr b="0" lang="en-AU" sz="1500" spc="-1" strike="noStrike">
                 <a:latin typeface="Arial"/>
               </a:rPr>
-              <a:t>Components:</a:t>
+              <a:t>Display:</a:t>
+            </a:r>
+            <a:r>
+              <a:rPr b="0" lang="en-AU" sz="1500" spc="-1" strike="noStrike">
+                <a:latin typeface="Arial"/>
+              </a:rPr>
+              <a:t>	</a:t>
             </a:r>
             <a:endParaRPr b="0" lang="en-AU" sz="1500" spc="-1" strike="noStrike">
               <a:latin typeface="Arial"/>
@@ -14655,6 +14671,24 @@
                 <a:spcPct val="100000"/>
               </a:lnSpc>
             </a:pPr>
+            <a:r>
+              <a:rPr b="0" lang="en-AU" sz="1500" spc="-1" strike="noStrike">
+                <a:latin typeface="Arial"/>
+              </a:rPr>
+              <a:t>	</a:t>
+            </a:r>
+            <a:r>
+              <a:rPr b="0" lang="en-AU" sz="1500" spc="-1" strike="noStrike">
+                <a:latin typeface="Arial"/>
+              </a:rPr>
+              <a:t>	</a:t>
+            </a:r>
+            <a:r>
+              <a:rPr b="0" lang="en-AU" sz="1500" spc="-1" strike="noStrike">
+                <a:latin typeface="Arial"/>
+              </a:rPr>
+              <a:t>Simple &amp; Hidden</a:t>
+            </a:r>
             <a:endParaRPr b="0" lang="en-AU" sz="1500" spc="-1" strike="noStrike">
               <a:latin typeface="Arial"/>
             </a:endParaRPr>
@@ -14669,14 +14703,62 @@
               <a:rPr b="0" lang="en-AU" sz="1500" spc="-1" strike="noStrike">
                 <a:latin typeface="Arial"/>
               </a:rPr>
-              <a:t>Display:</a:t>
-            </a:r>
+              <a:t>	</a:t>
+            </a:r>
+            <a:endParaRPr b="0" lang="en-AU" sz="1500" spc="-1" strike="noStrike">
+              <a:latin typeface="Arial"/>
+            </a:endParaRPr>
+          </a:p>
+          <a:p>
+            <a:pPr>
+              <a:lnSpc>
+                <a:spcPct val="100000"/>
+              </a:lnSpc>
+            </a:pPr>
+            <a:endParaRPr b="0" lang="en-AU" sz="1500" spc="-1" strike="noStrike">
+              <a:latin typeface="Arial"/>
+            </a:endParaRPr>
+          </a:p>
+          <a:p>
+            <a:pPr>
+              <a:lnSpc>
+                <a:spcPct val="100000"/>
+              </a:lnSpc>
+            </a:pPr>
             <a:r>
               <a:rPr b="0" lang="en-AU" sz="1500" spc="-1" strike="noStrike">
                 <a:latin typeface="Arial"/>
               </a:rPr>
+              <a:t>Content:</a:t>
+            </a:r>
+            <a:endParaRPr b="0" lang="en-AU" sz="1500" spc="-1" strike="noStrike">
+              <a:latin typeface="Arial"/>
+            </a:endParaRPr>
+          </a:p>
+          <a:p>
+            <a:pPr>
+              <a:lnSpc>
+                <a:spcPct val="100000"/>
+              </a:lnSpc>
+            </a:pPr>
+            <a:r>
+              <a:rPr b="0" lang="en-AU" sz="1500" spc="-1" strike="noStrike">
+                <a:latin typeface="Arial"/>
+              </a:rPr>
               <a:t>	</a:t>
             </a:r>
+            <a:r>
+              <a:rPr b="0" lang="en-AU" sz="1500" spc="-1" strike="noStrike">
+                <a:latin typeface="Arial"/>
+              </a:rPr>
+              <a:t>	</a:t>
+            </a:r>
+            <a:r>
+              <a:rPr b="0" lang="en-AU" sz="1500" spc="-1" strike="noStrike">
+                <a:latin typeface="Arial"/>
+              </a:rPr>
+              <a:t>Hidden Secret message</a:t>
+            </a:r>
             <a:endParaRPr b="0" lang="en-AU" sz="1500" spc="-1" strike="noStrike">
               <a:latin typeface="Arial"/>
             </a:endParaRPr>
@@ -14703,7 +14785,7 @@
               <a:rPr b="0" lang="en-AU" sz="1500" spc="-1" strike="noStrike">
                 <a:latin typeface="Arial"/>
               </a:rPr>
-              <a:t>Simple &amp; Hidden</a:t>
+              <a:t>Hidden About Me</a:t>
             </a:r>
             <a:endParaRPr b="0" lang="en-AU" sz="1500" spc="-1" strike="noStrike">
               <a:latin typeface="Arial"/>
@@ -14715,147 +14797,49 @@
                 <a:spcPct val="100000"/>
               </a:lnSpc>
             </a:pPr>
+            <a:endParaRPr b="0" lang="en-AU" sz="1500" spc="-1" strike="noStrike">
+              <a:latin typeface="Arial"/>
+            </a:endParaRPr>
+          </a:p>
+          <a:p>
+            <a:pPr>
+              <a:lnSpc>
+                <a:spcPct val="100000"/>
+              </a:lnSpc>
+            </a:pPr>
             <a:r>
               <a:rPr b="0" lang="en-AU" sz="1500" spc="-1" strike="noStrike">
                 <a:latin typeface="Arial"/>
               </a:rPr>
+              <a:t>Response:</a:t>
+            </a:r>
+            <a:endParaRPr b="0" lang="en-AU" sz="1500" spc="-1" strike="noStrike">
+              <a:latin typeface="Arial"/>
+            </a:endParaRPr>
+          </a:p>
+          <a:p>
+            <a:pPr>
+              <a:lnSpc>
+                <a:spcPct val="100000"/>
+              </a:lnSpc>
+            </a:pPr>
+            <a:r>
+              <a:rPr b="0" lang="en-AU" sz="1500" spc="-1" strike="noStrike">
+                <a:latin typeface="Arial"/>
+              </a:rPr>
               <a:t>	</a:t>
             </a:r>
-            <a:endParaRPr b="0" lang="en-AU" sz="1500" spc="-1" strike="noStrike">
-              <a:latin typeface="Arial"/>
-            </a:endParaRPr>
-          </a:p>
-          <a:p>
-            <a:pPr>
-              <a:lnSpc>
-                <a:spcPct val="100000"/>
-              </a:lnSpc>
-            </a:pPr>
-            <a:endParaRPr b="0" lang="en-AU" sz="1500" spc="-1" strike="noStrike">
-              <a:latin typeface="Arial"/>
-            </a:endParaRPr>
-          </a:p>
-          <a:p>
-            <a:pPr>
-              <a:lnSpc>
-                <a:spcPct val="100000"/>
-              </a:lnSpc>
-            </a:pPr>
             <a:r>
               <a:rPr b="0" lang="en-AU" sz="1500" spc="-1" strike="noStrike">
                 <a:latin typeface="Arial"/>
               </a:rPr>
-              <a:t>Content:</a:t>
-            </a:r>
-            <a:endParaRPr b="0" lang="en-AU" sz="1500" spc="-1" strike="noStrike">
-              <a:latin typeface="Arial"/>
-            </a:endParaRPr>
-          </a:p>
-          <a:p>
-            <a:pPr>
-              <a:lnSpc>
-                <a:spcPct val="100000"/>
-              </a:lnSpc>
-            </a:pPr>
+              <a:t>	</a:t>
+            </a:r>
             <a:r>
               <a:rPr b="0" lang="en-AU" sz="1500" spc="-1" strike="noStrike">
                 <a:latin typeface="Arial"/>
               </a:rPr>
-              <a:t>	</a:t>
-            </a:r>
-            <a:r>
-              <a:rPr b="0" lang="en-AU" sz="1500" spc="-1" strike="noStrike">
-                <a:latin typeface="Arial"/>
-              </a:rPr>
-              <a:t>	</a:t>
-            </a:r>
-            <a:r>
-              <a:rPr b="0" lang="en-AU" sz="1500" spc="-1" strike="noStrike">
-                <a:latin typeface="Arial"/>
-              </a:rPr>
-              <a:t>Hidden secret message</a:t>
-            </a:r>
-            <a:endParaRPr b="0" lang="en-AU" sz="1500" spc="-1" strike="noStrike">
-              <a:latin typeface="Arial"/>
-            </a:endParaRPr>
-          </a:p>
-          <a:p>
-            <a:pPr>
-              <a:lnSpc>
-                <a:spcPct val="100000"/>
-              </a:lnSpc>
-            </a:pPr>
-            <a:r>
-              <a:rPr b="0" lang="en-AU" sz="1500" spc="-1" strike="noStrike">
-                <a:latin typeface="Arial"/>
-              </a:rPr>
-              <a:t>	</a:t>
-            </a:r>
-            <a:r>
-              <a:rPr b="0" lang="en-AU" sz="1500" spc="-1" strike="noStrike">
-                <a:latin typeface="Arial"/>
-              </a:rPr>
-              <a:t>	</a:t>
-            </a:r>
-            <a:r>
-              <a:rPr b="0" lang="en-AU" sz="1500" spc="-1" strike="noStrike">
-                <a:latin typeface="Arial"/>
-              </a:rPr>
-              <a:t>Hidden about me</a:t>
-            </a:r>
-            <a:endParaRPr b="0" lang="en-AU" sz="1500" spc="-1" strike="noStrike">
-              <a:latin typeface="Arial"/>
-            </a:endParaRPr>
-          </a:p>
-          <a:p>
-            <a:pPr>
-              <a:lnSpc>
-                <a:spcPct val="100000"/>
-              </a:lnSpc>
-            </a:pPr>
-            <a:endParaRPr b="0" lang="en-AU" sz="1500" spc="-1" strike="noStrike">
-              <a:latin typeface="Arial"/>
-            </a:endParaRPr>
-          </a:p>
-          <a:p>
-            <a:pPr>
-              <a:lnSpc>
-                <a:spcPct val="100000"/>
-              </a:lnSpc>
-            </a:pPr>
-            <a:r>
-              <a:rPr b="0" lang="en-AU" sz="1500" spc="-1" strike="noStrike">
-                <a:latin typeface="Arial"/>
-              </a:rPr>
-              <a:t>Response:</a:t>
-            </a:r>
-            <a:endParaRPr b="0" lang="en-AU" sz="1500" spc="-1" strike="noStrike">
-              <a:latin typeface="Arial"/>
-            </a:endParaRPr>
-          </a:p>
-          <a:p>
-            <a:pPr>
-              <a:lnSpc>
-                <a:spcPct val="100000"/>
-              </a:lnSpc>
-            </a:pPr>
-            <a:r>
-              <a:rPr b="0" lang="en-AU" sz="1500" spc="-1" strike="noStrike">
-                <a:latin typeface="Arial"/>
-              </a:rPr>
-              <a:t>	</a:t>
-            </a:r>
-            <a:r>
-              <a:rPr b="0" lang="en-AU" sz="1500" spc="-1" strike="noStrike">
-                <a:latin typeface="Arial"/>
-              </a:rPr>
-              <a:t>	</a:t>
-            </a:r>
-            <a:r>
-              <a:rPr b="0" lang="en-AU" sz="1500" spc="-1" strike="noStrike">
-                <a:latin typeface="Arial"/>
-              </a:rPr>
-              <a:t>nothing major</a:t>
+              <a:t>Scales to all screens</a:t>
             </a:r>
             <a:endParaRPr b="0" lang="en-AU" sz="1500" spc="-1" strike="noStrike">
               <a:latin typeface="Arial"/>
@@ -15045,7 +15029,7 @@
       </p:grpSpPr>
       <p:sp>
         <p:nvSpPr>
-          <p:cNvPr id="365" name="CustomShape 1"/>
+          <p:cNvPr id="369" name="CustomShape 1"/>
           <p:cNvSpPr/>
           <p:nvPr/>
         </p:nvSpPr>
@@ -15096,7 +15080,7 @@
       </p:sp>
       <p:sp>
         <p:nvSpPr>
-          <p:cNvPr id="366" name="CustomShape 2"/>
+          <p:cNvPr id="370" name="CustomShape 2"/>
           <p:cNvSpPr/>
           <p:nvPr/>
         </p:nvSpPr>
@@ -15122,7 +15106,7 @@
       </p:sp>
       <p:sp>
         <p:nvSpPr>
-          <p:cNvPr id="367" name="CustomShape 3"/>
+          <p:cNvPr id="371" name="CustomShape 3"/>
           <p:cNvSpPr/>
           <p:nvPr/>
         </p:nvSpPr>
@@ -15148,7 +15132,7 @@
       </p:sp>
       <p:pic>
         <p:nvPicPr>
-          <p:cNvPr id="368" name="" descr=""/>
+          <p:cNvPr id="372" name="" descr=""/>
           <p:cNvPicPr/>
           <p:nvPr/>
         </p:nvPicPr>
@@ -15171,7 +15155,7 @@
       </p:pic>
       <p:pic>
         <p:nvPicPr>
-          <p:cNvPr id="369" name="" descr=""/>
+          <p:cNvPr id="373" name="" descr=""/>
           <p:cNvPicPr/>
           <p:nvPr/>
         </p:nvPicPr>
@@ -15194,7 +15178,7 @@
       </p:pic>
       <p:sp>
         <p:nvSpPr>
-          <p:cNvPr id="370" name="CustomShape 4"/>
+          <p:cNvPr id="374" name="CustomShape 4"/>
           <p:cNvSpPr/>
           <p:nvPr/>
         </p:nvSpPr>
@@ -15277,7 +15261,7 @@
       </p:sp>
       <p:sp>
         <p:nvSpPr>
-          <p:cNvPr id="371" name="CustomShape 5"/>
+          <p:cNvPr id="375" name="CustomShape 5"/>
           <p:cNvSpPr/>
           <p:nvPr/>
         </p:nvSpPr>
@@ -15350,7 +15334,7 @@
               <a:rPr b="0" lang="en-AU" sz="1800" spc="-1" strike="noStrike">
                 <a:latin typeface="Arial"/>
               </a:rPr>
-              <a:t>css Background: automatically resizes </a:t>
+              <a:t>CSS Background: automatically resizes </a:t>
             </a:r>
             <a:endParaRPr b="0" lang="en-AU" sz="1800" spc="-1" strike="noStrike">
               <a:latin typeface="Arial"/>
@@ -15390,7 +15374,7 @@
       </p:grpSpPr>
       <p:sp>
         <p:nvSpPr>
-          <p:cNvPr id="372" name="CustomShape 1"/>
+          <p:cNvPr id="376" name="CustomShape 1"/>
           <p:cNvSpPr/>
           <p:nvPr/>
         </p:nvSpPr>
@@ -15441,7 +15425,7 @@
       </p:sp>
       <p:sp>
         <p:nvSpPr>
-          <p:cNvPr id="373" name="CustomShape 2"/>
+          <p:cNvPr id="377" name="CustomShape 2"/>
           <p:cNvSpPr/>
           <p:nvPr/>
         </p:nvSpPr>
@@ -15467,7 +15451,7 @@
       </p:sp>
       <p:sp>
         <p:nvSpPr>
-          <p:cNvPr id="374" name="CustomShape 3"/>
+          <p:cNvPr id="378" name="CustomShape 3"/>
           <p:cNvSpPr/>
           <p:nvPr/>
         </p:nvSpPr>
@@ -15493,7 +15477,7 @@
       </p:sp>
       <p:pic>
         <p:nvPicPr>
-          <p:cNvPr id="375" name="" descr=""/>
+          <p:cNvPr id="379" name="" descr=""/>
           <p:cNvPicPr/>
           <p:nvPr/>
         </p:nvPicPr>
@@ -15516,7 +15500,7 @@
       </p:pic>
       <p:sp>
         <p:nvSpPr>
-          <p:cNvPr id="376" name="CustomShape 4"/>
+          <p:cNvPr id="380" name="CustomShape 4"/>
           <p:cNvSpPr/>
           <p:nvPr/>
         </p:nvSpPr>
@@ -15559,6 +15543,12 @@
                 <a:spcPct val="100000"/>
               </a:lnSpc>
             </a:pPr>
+            <a:r>
+              <a:rPr b="0" lang="en-AU" sz="1800" spc="-1" strike="noStrike">
+                <a:latin typeface="Arial"/>
+              </a:rPr>
+              <a:t>Display:</a:t>
+            </a:r>
             <a:endParaRPr b="0" lang="en-AU" sz="1800" spc="-1" strike="noStrike">
               <a:latin typeface="Arial"/>
             </a:endParaRPr>
@@ -15569,12 +15559,6 @@
                 <a:spcPct val="100000"/>
               </a:lnSpc>
             </a:pPr>
-            <a:r>
-              <a:rPr b="0" lang="en-AU" sz="1800" spc="-1" strike="noStrike">
-                <a:latin typeface="Arial"/>
-              </a:rPr>
-              <a:t>Display:</a:t>
-            </a:r>
             <a:endParaRPr b="0" lang="en-AU" sz="1800" spc="-1" strike="noStrike">
               <a:latin typeface="Arial"/>
             </a:endParaRPr>
@@ -15585,6 +15569,18 @@
                 <a:spcPct val="100000"/>
               </a:lnSpc>
             </a:pPr>
+            <a:r>
+              <a:rPr b="0" lang="en-AU" sz="1800" spc="-1" strike="noStrike">
+                <a:latin typeface="Arial"/>
+              </a:rPr>
+              <a:t>	</a:t>
+            </a:r>
+            <a:r>
+              <a:rPr b="0" lang="en-AU" sz="1800" spc="-1" strike="noStrike">
+                <a:latin typeface="Arial"/>
+              </a:rPr>
+              <a:t>Grid template columns</a:t>
+            </a:r>
             <a:endParaRPr b="0" lang="en-AU" sz="1800" spc="-1" strike="noStrike">
               <a:latin typeface="Arial"/>
             </a:endParaRPr>
@@ -15595,6 +15591,32 @@
                 <a:spcPct val="100000"/>
               </a:lnSpc>
             </a:pPr>
+            <a:endParaRPr b="0" lang="en-AU" sz="1800" spc="-1" strike="noStrike">
+              <a:latin typeface="Arial"/>
+            </a:endParaRPr>
+          </a:p>
+          <a:p>
+            <a:pPr>
+              <a:lnSpc>
+                <a:spcPct val="100000"/>
+              </a:lnSpc>
+            </a:pPr>
+            <a:r>
+              <a:rPr b="0" lang="en-AU" sz="1800" spc="-1" strike="noStrike">
+                <a:latin typeface="Arial"/>
+              </a:rPr>
+              <a:t>+1400px: </a:t>
+            </a:r>
+            <a:endParaRPr b="0" lang="en-AU" sz="1800" spc="-1" strike="noStrike">
+              <a:latin typeface="Arial"/>
+            </a:endParaRPr>
+          </a:p>
+          <a:p>
+            <a:pPr>
+              <a:lnSpc>
+                <a:spcPct val="100000"/>
+              </a:lnSpc>
+            </a:pPr>
             <a:r>
               <a:rPr b="0" lang="en-AU" sz="1800" spc="-1" strike="noStrike">
                 <a:latin typeface="Arial"/>
@@ -15605,61 +15627,13 @@
               <a:rPr b="0" lang="en-AU" sz="1800" spc="-1" strike="noStrike">
                 <a:latin typeface="Arial"/>
               </a:rPr>
-              <a:t>Grid template columns</a:t>
-            </a:r>
-            <a:endParaRPr b="0" lang="en-AU" sz="1800" spc="-1" strike="noStrike">
-              <a:latin typeface="Arial"/>
-            </a:endParaRPr>
-          </a:p>
-          <a:p>
-            <a:pPr>
-              <a:lnSpc>
-                <a:spcPct val="100000"/>
-              </a:lnSpc>
-            </a:pPr>
-            <a:endParaRPr b="0" lang="en-AU" sz="1800" spc="-1" strike="noStrike">
-              <a:latin typeface="Arial"/>
-            </a:endParaRPr>
-          </a:p>
-          <a:p>
-            <a:pPr>
-              <a:lnSpc>
-                <a:spcPct val="100000"/>
-              </a:lnSpc>
-            </a:pPr>
-            <a:r>
-              <a:rPr b="0" lang="en-AU" sz="1800" spc="-1" strike="noStrike">
-                <a:latin typeface="Arial"/>
-              </a:rPr>
-              <a:t>@1400px: </a:t>
-            </a:r>
-            <a:endParaRPr b="0" lang="en-AU" sz="1800" spc="-1" strike="noStrike">
-              <a:latin typeface="Arial"/>
-            </a:endParaRPr>
-          </a:p>
-          <a:p>
-            <a:pPr>
-              <a:lnSpc>
-                <a:spcPct val="100000"/>
-              </a:lnSpc>
-            </a:pPr>
-            <a:r>
-              <a:rPr b="0" lang="en-AU" sz="1800" spc="-1" strike="noStrike">
-                <a:latin typeface="Arial"/>
-              </a:rPr>
               <a:t>	</a:t>
             </a:r>
             <a:r>
               <a:rPr b="0" lang="en-AU" sz="1800" spc="-1" strike="noStrike">
                 <a:latin typeface="Arial"/>
               </a:rPr>
-              <a:t>	</a:t>
-            </a:r>
-            <a:r>
-              <a:rPr b="0" lang="en-AU" sz="1800" spc="-1" strike="noStrike">
-                <a:latin typeface="Arial"/>
-              </a:rPr>
-              <a:t>4 grids</a:t>
+              <a:t>4 columns</a:t>
             </a:r>
             <a:endParaRPr b="0" lang="en-AU" sz="1800" spc="-1" strike="noStrike">
               <a:latin typeface="Arial"/>
@@ -15853,7 +15827,7 @@
       </p:grpSpPr>
       <p:sp>
         <p:nvSpPr>
-          <p:cNvPr id="377" name="CustomShape 1"/>
+          <p:cNvPr id="381" name="CustomShape 1"/>
           <p:cNvSpPr/>
           <p:nvPr/>
         </p:nvSpPr>
@@ -15904,7 +15878,7 @@
       </p:sp>
       <p:sp>
         <p:nvSpPr>
-          <p:cNvPr id="378" name="CustomShape 2"/>
+          <p:cNvPr id="382" name="CustomShape 2"/>
           <p:cNvSpPr/>
           <p:nvPr/>
         </p:nvSpPr>
@@ -15930,7 +15904,7 @@
       </p:sp>
       <p:sp>
         <p:nvSpPr>
-          <p:cNvPr id="379" name="CustomShape 3"/>
+          <p:cNvPr id="383" name="CustomShape 3"/>
           <p:cNvSpPr/>
           <p:nvPr/>
         </p:nvSpPr>
@@ -15956,7 +15930,7 @@
       </p:sp>
       <p:pic>
         <p:nvPicPr>
-          <p:cNvPr id="380" name="" descr=""/>
+          <p:cNvPr id="384" name="" descr=""/>
           <p:cNvPicPr/>
           <p:nvPr/>
         </p:nvPicPr>
@@ -15979,7 +15953,7 @@
       </p:pic>
       <p:pic>
         <p:nvPicPr>
-          <p:cNvPr id="381" name="" descr=""/>
+          <p:cNvPr id="385" name="" descr=""/>
           <p:cNvPicPr/>
           <p:nvPr/>
         </p:nvPicPr>
@@ -16002,7 +15976,7 @@
       </p:pic>
       <p:sp>
         <p:nvSpPr>
-          <p:cNvPr id="382" name="CustomShape 4"/>
+          <p:cNvPr id="386" name="CustomShape 4"/>
           <p:cNvSpPr/>
           <p:nvPr/>
         </p:nvSpPr>
@@ -16065,7 +16039,7 @@
               <a:rPr b="0" lang="en-AU" sz="1800" spc="-1" strike="noStrike">
                 <a:latin typeface="Arial"/>
               </a:rPr>
-              <a:t>800px:</a:t>
+              <a:t>-800px:</a:t>
             </a:r>
             <a:endParaRPr b="0" lang="en-AU" sz="1800" spc="-1" strike="noStrike">
               <a:latin typeface="Arial"/>
@@ -16133,7 +16107,7 @@
       </p:sp>
       <p:sp>
         <p:nvSpPr>
-          <p:cNvPr id="383" name="CustomShape 5"/>
+          <p:cNvPr id="387" name="CustomShape 5"/>
           <p:cNvSpPr/>
           <p:nvPr/>
         </p:nvSpPr>
@@ -16196,7 +16170,7 @@
               <a:rPr b="0" lang="en-AU" sz="1800" spc="-1" strike="noStrike">
                 <a:latin typeface="Arial"/>
               </a:rPr>
-              <a:t>1400px:</a:t>
+              <a:t>-1400px:</a:t>
             </a:r>
             <a:endParaRPr b="0" lang="en-AU" sz="1800" spc="-1" strike="noStrike">
               <a:latin typeface="Arial"/>
@@ -16288,7 +16262,7 @@
       </p:grpSpPr>
       <p:sp>
         <p:nvSpPr>
-          <p:cNvPr id="384" name="CustomShape 1"/>
+          <p:cNvPr id="388" name="CustomShape 1"/>
           <p:cNvSpPr/>
           <p:nvPr/>
         </p:nvSpPr>
@@ -16339,7 +16313,7 @@
       </p:sp>
       <p:sp>
         <p:nvSpPr>
-          <p:cNvPr id="385" name="CustomShape 2"/>
+          <p:cNvPr id="389" name="CustomShape 2"/>
           <p:cNvSpPr/>
           <p:nvPr/>
         </p:nvSpPr>
@@ -16365,7 +16339,7 @@
       </p:sp>
       <p:sp>
         <p:nvSpPr>
-          <p:cNvPr id="386" name="CustomShape 3"/>
+          <p:cNvPr id="390" name="CustomShape 3"/>
           <p:cNvSpPr/>
           <p:nvPr/>
         </p:nvSpPr>
@@ -16391,7 +16365,7 @@
       </p:sp>
       <p:pic>
         <p:nvPicPr>
-          <p:cNvPr id="387" name="" descr=""/>
+          <p:cNvPr id="391" name="" descr=""/>
           <p:cNvPicPr/>
           <p:nvPr/>
         </p:nvPicPr>
@@ -16414,7 +16388,7 @@
       </p:pic>
       <p:sp>
         <p:nvSpPr>
-          <p:cNvPr id="388" name="CustomShape 4"/>
+          <p:cNvPr id="392" name="CustomShape 4"/>
           <p:cNvSpPr/>
           <p:nvPr/>
         </p:nvSpPr>
@@ -16461,6 +16435,66 @@
               <a:rPr b="0" lang="en-AU" sz="1800" spc="-1" strike="noStrike">
                 <a:latin typeface="Arial"/>
               </a:rPr>
+              <a:t>Component:</a:t>
+            </a:r>
+            <a:endParaRPr b="0" lang="en-AU" sz="1800" spc="-1" strike="noStrike">
+              <a:latin typeface="Arial"/>
+            </a:endParaRPr>
+          </a:p>
+          <a:p>
+            <a:pPr>
+              <a:lnSpc>
+                <a:spcPct val="100000"/>
+              </a:lnSpc>
+            </a:pPr>
+            <a:r>
+              <a:rPr b="0" lang="en-AU" sz="1800" spc="-1" strike="noStrike">
+                <a:latin typeface="Arial"/>
+              </a:rPr>
+              <a:t>	</a:t>
+            </a:r>
+            <a:r>
+              <a:rPr b="0" lang="en-AU" sz="1800" spc="-1" strike="noStrike">
+                <a:latin typeface="Arial"/>
+              </a:rPr>
+              <a:t>	</a:t>
+            </a:r>
+            <a:r>
+              <a:rPr b="0" lang="en-AU" sz="1800" spc="-1" strike="noStrike">
+                <a:latin typeface="Arial"/>
+              </a:rPr>
+              <a:t>	</a:t>
+            </a:r>
+            <a:r>
+              <a:rPr b="0" lang="en-AU" sz="1800" spc="-1" strike="noStrike">
+                <a:latin typeface="Arial"/>
+              </a:rPr>
+              <a:t>JS + jQuery</a:t>
+            </a:r>
+            <a:endParaRPr b="0" lang="en-AU" sz="1800" spc="-1" strike="noStrike">
+              <a:latin typeface="Arial"/>
+            </a:endParaRPr>
+          </a:p>
+          <a:p>
+            <a:pPr>
+              <a:lnSpc>
+                <a:spcPct val="100000"/>
+              </a:lnSpc>
+            </a:pPr>
+            <a:endParaRPr b="0" lang="en-AU" sz="1800" spc="-1" strike="noStrike">
+              <a:latin typeface="Arial"/>
+            </a:endParaRPr>
+          </a:p>
+          <a:p>
+            <a:pPr>
+              <a:lnSpc>
+                <a:spcPct val="100000"/>
+              </a:lnSpc>
+            </a:pPr>
+            <a:r>
+              <a:rPr b="0" lang="en-AU" sz="1800" spc="-1" strike="noStrike">
+                <a:latin typeface="Arial"/>
+              </a:rPr>
               <a:t>Display:</a:t>
             </a:r>
             <a:endParaRPr b="0" lang="en-AU" sz="1800" spc="-1" strike="noStrike">
@@ -16499,7 +16533,7 @@
               <a:rPr b="0" lang="en-AU" sz="1800" spc="-1" strike="noStrike">
                 <a:latin typeface="Arial"/>
               </a:rPr>
-              <a:t>Collapse Site Nav</a:t>
+              <a:t>Collapsible Nav Menu</a:t>
             </a:r>
             <a:endParaRPr b="0" lang="en-AU" sz="1800" spc="-1" strike="noStrike">
               <a:latin typeface="Arial"/>
@@ -16637,7 +16671,7 @@
       </p:grpSpPr>
       <p:sp>
         <p:nvSpPr>
-          <p:cNvPr id="389" name="CustomShape 1"/>
+          <p:cNvPr id="393" name="CustomShape 1"/>
           <p:cNvSpPr/>
           <p:nvPr/>
         </p:nvSpPr>
@@ -16684,7 +16718,7 @@
       </p:sp>
       <p:pic>
         <p:nvPicPr>
-          <p:cNvPr id="390" name="" descr=""/>
+          <p:cNvPr id="394" name="" descr=""/>
           <p:cNvPicPr/>
           <p:nvPr/>
         </p:nvPicPr>
@@ -16707,7 +16741,7 @@
       </p:pic>
       <p:pic>
         <p:nvPicPr>
-          <p:cNvPr id="391" name="" descr=""/>
+          <p:cNvPr id="395" name="" descr=""/>
           <p:cNvPicPr/>
           <p:nvPr/>
         </p:nvPicPr>
@@ -16730,7 +16764,7 @@
       </p:pic>
       <p:sp>
         <p:nvSpPr>
-          <p:cNvPr id="392" name="CustomShape 2"/>
+          <p:cNvPr id="396" name="CustomShape 2"/>
           <p:cNvSpPr/>
           <p:nvPr/>
         </p:nvSpPr>
@@ -16777,7 +16811,7 @@
       </p:sp>
       <p:sp>
         <p:nvSpPr>
-          <p:cNvPr id="393" name="CustomShape 3"/>
+          <p:cNvPr id="397" name="CustomShape 3"/>
           <p:cNvSpPr/>
           <p:nvPr/>
         </p:nvSpPr>
@@ -16854,7 +16888,7 @@
       </p:grpSpPr>
       <p:sp>
         <p:nvSpPr>
-          <p:cNvPr id="394" name="CustomShape 1"/>
+          <p:cNvPr id="398" name="CustomShape 1"/>
           <p:cNvSpPr/>
           <p:nvPr/>
         </p:nvSpPr>
@@ -16901,7 +16935,7 @@
       </p:sp>
       <p:pic>
         <p:nvPicPr>
-          <p:cNvPr id="395" name="" descr=""/>
+          <p:cNvPr id="399" name="" descr=""/>
           <p:cNvPicPr/>
           <p:nvPr/>
         </p:nvPicPr>
@@ -16924,7 +16958,7 @@
       </p:pic>
       <p:sp>
         <p:nvSpPr>
-          <p:cNvPr id="396" name="CustomShape 2"/>
+          <p:cNvPr id="400" name="CustomShape 2"/>
           <p:cNvSpPr/>
           <p:nvPr/>
         </p:nvSpPr>
@@ -16971,7 +17005,7 @@
       </p:sp>
       <p:pic>
         <p:nvPicPr>
-          <p:cNvPr id="397" name="" descr=""/>
+          <p:cNvPr id="401" name="" descr=""/>
           <p:cNvPicPr/>
           <p:nvPr/>
         </p:nvPicPr>
@@ -16994,7 +17028,7 @@
       </p:pic>
       <p:sp>
         <p:nvSpPr>
-          <p:cNvPr id="398" name="CustomShape 3"/>
+          <p:cNvPr id="402" name="CustomShape 3"/>
           <p:cNvSpPr/>
           <p:nvPr/>
         </p:nvSpPr>
@@ -17071,7 +17105,7 @@
       </p:grpSpPr>
       <p:sp>
         <p:nvSpPr>
-          <p:cNvPr id="399" name="CustomShape 1"/>
+          <p:cNvPr id="403" name="CustomShape 1"/>
           <p:cNvSpPr/>
           <p:nvPr/>
         </p:nvSpPr>
@@ -17118,7 +17152,7 @@
       </p:sp>
       <p:sp>
         <p:nvSpPr>
-          <p:cNvPr id="400" name="CustomShape 2"/>
+          <p:cNvPr id="404" name="CustomShape 2"/>
           <p:cNvSpPr/>
           <p:nvPr/>
         </p:nvSpPr>
@@ -17165,7 +17199,7 @@
       </p:sp>
       <p:sp>
         <p:nvSpPr>
-          <p:cNvPr id="401" name="CustomShape 3"/>
+          <p:cNvPr id="405" name="CustomShape 3"/>
           <p:cNvSpPr/>
           <p:nvPr/>
         </p:nvSpPr>
@@ -17212,7 +17246,7 @@
       </p:sp>
       <p:pic>
         <p:nvPicPr>
-          <p:cNvPr id="402" name="" descr=""/>
+          <p:cNvPr id="406" name="" descr=""/>
           <p:cNvPicPr/>
           <p:nvPr/>
         </p:nvPicPr>
@@ -17235,7 +17269,7 @@
       </p:pic>
       <p:pic>
         <p:nvPicPr>
-          <p:cNvPr id="403" name="" descr=""/>
+          <p:cNvPr id="407" name="" descr=""/>
           <p:cNvPicPr/>
           <p:nvPr/>
         </p:nvPicPr>
@@ -17288,7 +17322,7 @@
       </p:grpSpPr>
       <p:sp>
         <p:nvSpPr>
-          <p:cNvPr id="404" name="CustomShape 1"/>
+          <p:cNvPr id="408" name="CustomShape 1"/>
           <p:cNvSpPr/>
           <p:nvPr/>
         </p:nvSpPr>
@@ -17335,7 +17369,7 @@
       </p:sp>
       <p:sp>
         <p:nvSpPr>
-          <p:cNvPr id="405" name="CustomShape 2"/>
+          <p:cNvPr id="409" name="CustomShape 2"/>
           <p:cNvSpPr/>
           <p:nvPr/>
         </p:nvSpPr>
@@ -17382,7 +17416,7 @@
       </p:sp>
       <p:sp>
         <p:nvSpPr>
-          <p:cNvPr id="406" name="CustomShape 3"/>
+          <p:cNvPr id="410" name="CustomShape 3"/>
           <p:cNvSpPr/>
           <p:nvPr/>
         </p:nvSpPr>
@@ -17429,7 +17463,7 @@
       </p:sp>
       <p:pic>
         <p:nvPicPr>
-          <p:cNvPr id="407" name="" descr=""/>
+          <p:cNvPr id="411" name="" descr=""/>
           <p:cNvPicPr/>
           <p:nvPr/>
         </p:nvPicPr>
@@ -17452,7 +17486,7 @@
       </p:pic>
       <p:pic>
         <p:nvPicPr>
-          <p:cNvPr id="408" name="" descr=""/>
+          <p:cNvPr id="412" name="" descr=""/>
           <p:cNvPicPr/>
           <p:nvPr/>
         </p:nvPicPr>
@@ -17742,7 +17776,7 @@
                 <a:latin typeface="Arial"/>
                 <a:ea typeface="Noto Sans CJK SC"/>
               </a:rPr>
-              <a:t>Wireframe </a:t>
+              <a:t>Frame-It </a:t>
             </a:r>
             <a:r>
               <a:rPr b="0" lang="en-AU" sz="1800" spc="-1" strike="noStrike">
@@ -17874,7 +17908,7 @@
                 <a:latin typeface="Arial"/>
                 <a:ea typeface="Noto Sans CJK SC"/>
               </a:rPr>
-              <a:t>Brickwall </a:t>
+              <a:t>Brick-Wall </a:t>
             </a:r>
             <a:r>
               <a:rPr b="0" lang="en-AU" sz="1800" spc="-1" strike="noStrike">
@@ -17970,7 +18004,7 @@
                 <a:latin typeface="Arial"/>
                 <a:ea typeface="Noto Sans CJK SC"/>
               </a:rPr>
-              <a:t>–  Throw a spanner in the works - the Break-It/Fix-It model</a:t>
+              <a:t>–  Throw a spanner in the works - the Break-It/Fix-It Model</a:t>
             </a:r>
             <a:endParaRPr b="0" lang="en-AU" sz="1800" spc="-1" strike="noStrike">
               <a:solidFill>
@@ -18006,7 +18040,7 @@
                 <a:latin typeface="Arial"/>
                 <a:ea typeface="Noto Sans CJK SC"/>
               </a:rPr>
-              <a:t>Decision </a:t>
+              <a:t>Decisions </a:t>
             </a:r>
             <a:r>
               <a:rPr b="0" lang="en-AU" sz="1800" spc="-1" strike="noStrike">
@@ -18135,7 +18169,7 @@
       </p:grpSpPr>
       <p:sp>
         <p:nvSpPr>
-          <p:cNvPr id="409" name="CustomShape 1"/>
+          <p:cNvPr id="413" name="CustomShape 1"/>
           <p:cNvSpPr/>
           <p:nvPr/>
         </p:nvSpPr>
@@ -18182,7 +18216,7 @@
       </p:sp>
       <p:sp>
         <p:nvSpPr>
-          <p:cNvPr id="410" name="CustomShape 2"/>
+          <p:cNvPr id="414" name="CustomShape 2"/>
           <p:cNvSpPr/>
           <p:nvPr/>
         </p:nvSpPr>
@@ -18229,7 +18263,7 @@
       </p:sp>
       <p:sp>
         <p:nvSpPr>
-          <p:cNvPr id="411" name="CustomShape 3"/>
+          <p:cNvPr id="415" name="CustomShape 3"/>
           <p:cNvSpPr/>
           <p:nvPr/>
         </p:nvSpPr>
@@ -18276,7 +18310,7 @@
       </p:sp>
       <p:pic>
         <p:nvPicPr>
-          <p:cNvPr id="412" name="" descr=""/>
+          <p:cNvPr id="416" name="" descr=""/>
           <p:cNvPicPr/>
           <p:nvPr/>
         </p:nvPicPr>
@@ -18299,7 +18333,7 @@
       </p:pic>
       <p:pic>
         <p:nvPicPr>
-          <p:cNvPr id="413" name="" descr=""/>
+          <p:cNvPr id="417" name="" descr=""/>
           <p:cNvPicPr/>
           <p:nvPr/>
         </p:nvPicPr>
@@ -18352,7 +18386,7 @@
       </p:grpSpPr>
       <p:sp>
         <p:nvSpPr>
-          <p:cNvPr id="414" name="CustomShape 1"/>
+          <p:cNvPr id="418" name="CustomShape 1"/>
           <p:cNvSpPr/>
           <p:nvPr/>
         </p:nvSpPr>
@@ -18399,7 +18433,7 @@
       </p:sp>
       <p:sp>
         <p:nvSpPr>
-          <p:cNvPr id="415" name="CustomShape 2"/>
+          <p:cNvPr id="419" name="CustomShape 2"/>
           <p:cNvSpPr/>
           <p:nvPr/>
         </p:nvSpPr>
@@ -18446,7 +18480,7 @@
       </p:sp>
       <p:sp>
         <p:nvSpPr>
-          <p:cNvPr id="416" name="CustomShape 3"/>
+          <p:cNvPr id="420" name="CustomShape 3"/>
           <p:cNvSpPr/>
           <p:nvPr/>
         </p:nvSpPr>
@@ -18493,7 +18527,7 @@
       </p:sp>
       <p:pic>
         <p:nvPicPr>
-          <p:cNvPr id="417" name="" descr=""/>
+          <p:cNvPr id="421" name="" descr=""/>
           <p:cNvPicPr/>
           <p:nvPr/>
         </p:nvPicPr>
@@ -18516,7 +18550,7 @@
       </p:pic>
       <p:pic>
         <p:nvPicPr>
-          <p:cNvPr id="418" name="" descr=""/>
+          <p:cNvPr id="422" name="" descr=""/>
           <p:cNvPicPr/>
           <p:nvPr/>
         </p:nvPicPr>
@@ -18569,7 +18603,7 @@
       </p:grpSpPr>
       <p:sp>
         <p:nvSpPr>
-          <p:cNvPr id="419" name="CustomShape 1"/>
+          <p:cNvPr id="423" name="CustomShape 1"/>
           <p:cNvSpPr/>
           <p:nvPr/>
         </p:nvSpPr>
@@ -18616,7 +18650,7 @@
       </p:sp>
       <p:sp>
         <p:nvSpPr>
-          <p:cNvPr id="420" name="CustomShape 2"/>
+          <p:cNvPr id="424" name="CustomShape 2"/>
           <p:cNvSpPr/>
           <p:nvPr/>
         </p:nvSpPr>
@@ -18663,7 +18697,7 @@
       </p:sp>
       <p:sp>
         <p:nvSpPr>
-          <p:cNvPr id="421" name="CustomShape 3"/>
+          <p:cNvPr id="425" name="CustomShape 3"/>
           <p:cNvSpPr/>
           <p:nvPr/>
         </p:nvSpPr>
@@ -18710,7 +18744,7 @@
       </p:sp>
       <p:pic>
         <p:nvPicPr>
-          <p:cNvPr id="422" name="" descr=""/>
+          <p:cNvPr id="426" name="" descr=""/>
           <p:cNvPicPr/>
           <p:nvPr/>
         </p:nvPicPr>
@@ -18733,7 +18767,7 @@
       </p:pic>
       <p:pic>
         <p:nvPicPr>
-          <p:cNvPr id="423" name="" descr=""/>
+          <p:cNvPr id="427" name="" descr=""/>
           <p:cNvPicPr/>
           <p:nvPr/>
         </p:nvPicPr>
@@ -18786,7 +18820,7 @@
       </p:grpSpPr>
       <p:sp>
         <p:nvSpPr>
-          <p:cNvPr id="424" name="CustomShape 1"/>
+          <p:cNvPr id="428" name="CustomShape 1"/>
           <p:cNvSpPr/>
           <p:nvPr/>
         </p:nvSpPr>
@@ -18833,7 +18867,7 @@
       </p:sp>
       <p:sp>
         <p:nvSpPr>
-          <p:cNvPr id="425" name="CustomShape 2"/>
+          <p:cNvPr id="429" name="CustomShape 2"/>
           <p:cNvSpPr/>
           <p:nvPr/>
         </p:nvSpPr>
@@ -18880,7 +18914,7 @@
       </p:sp>
       <p:sp>
         <p:nvSpPr>
-          <p:cNvPr id="426" name="CustomShape 3"/>
+          <p:cNvPr id="430" name="CustomShape 3"/>
           <p:cNvSpPr/>
           <p:nvPr/>
         </p:nvSpPr>
@@ -18927,7 +18961,7 @@
       </p:sp>
       <p:pic>
         <p:nvPicPr>
-          <p:cNvPr id="427" name="" descr=""/>
+          <p:cNvPr id="431" name="" descr=""/>
           <p:cNvPicPr/>
           <p:nvPr/>
         </p:nvPicPr>
@@ -18950,7 +18984,7 @@
       </p:pic>
       <p:pic>
         <p:nvPicPr>
-          <p:cNvPr id="428" name="" descr=""/>
+          <p:cNvPr id="432" name="" descr=""/>
           <p:cNvPicPr/>
           <p:nvPr/>
         </p:nvPicPr>
@@ -19003,7 +19037,7 @@
       </p:grpSpPr>
       <p:sp>
         <p:nvSpPr>
-          <p:cNvPr id="429" name="CustomShape 1"/>
+          <p:cNvPr id="433" name="CustomShape 1"/>
           <p:cNvSpPr/>
           <p:nvPr/>
         </p:nvSpPr>
@@ -19050,7 +19084,7 @@
       </p:sp>
       <p:sp>
         <p:nvSpPr>
-          <p:cNvPr id="430" name="CustomShape 2"/>
+          <p:cNvPr id="434" name="CustomShape 2"/>
           <p:cNvSpPr/>
           <p:nvPr/>
         </p:nvSpPr>
@@ -19097,7 +19131,7 @@
       </p:sp>
       <p:sp>
         <p:nvSpPr>
-          <p:cNvPr id="431" name="CustomShape 3"/>
+          <p:cNvPr id="435" name="CustomShape 3"/>
           <p:cNvSpPr/>
           <p:nvPr/>
         </p:nvSpPr>
@@ -19144,7 +19178,7 @@
       </p:sp>
       <p:pic>
         <p:nvPicPr>
-          <p:cNvPr id="432" name="" descr=""/>
+          <p:cNvPr id="436" name="" descr=""/>
           <p:cNvPicPr/>
           <p:nvPr/>
         </p:nvPicPr>
@@ -19167,7 +19201,7 @@
       </p:pic>
       <p:pic>
         <p:nvPicPr>
-          <p:cNvPr id="433" name="" descr=""/>
+          <p:cNvPr id="437" name="" descr=""/>
           <p:cNvPicPr/>
           <p:nvPr/>
         </p:nvPicPr>
@@ -19190,7 +19224,7 @@
       </p:pic>
       <p:sp>
         <p:nvSpPr>
-          <p:cNvPr id="434" name="CustomShape 4"/>
+          <p:cNvPr id="438" name="CustomShape 4"/>
           <p:cNvSpPr/>
           <p:nvPr/>
         </p:nvSpPr>
@@ -19237,7 +19271,7 @@
       </p:sp>
       <p:pic>
         <p:nvPicPr>
-          <p:cNvPr id="435" name="" descr=""/>
+          <p:cNvPr id="439" name="" descr=""/>
           <p:cNvPicPr/>
           <p:nvPr/>
         </p:nvPicPr>
@@ -19290,7 +19324,7 @@
       </p:grpSpPr>
       <p:sp>
         <p:nvSpPr>
-          <p:cNvPr id="436" name="CustomShape 1"/>
+          <p:cNvPr id="440" name="CustomShape 1"/>
           <p:cNvSpPr/>
           <p:nvPr/>
         </p:nvSpPr>
@@ -19337,7 +19371,7 @@
       </p:sp>
       <p:sp>
         <p:nvSpPr>
-          <p:cNvPr id="437" name="CustomShape 2"/>
+          <p:cNvPr id="441" name="CustomShape 2"/>
           <p:cNvSpPr/>
           <p:nvPr/>
         </p:nvSpPr>
@@ -19384,7 +19418,7 @@
       </p:sp>
       <p:sp>
         <p:nvSpPr>
-          <p:cNvPr id="438" name="CustomShape 3"/>
+          <p:cNvPr id="442" name="CustomShape 3"/>
           <p:cNvSpPr/>
           <p:nvPr/>
         </p:nvSpPr>
@@ -19431,7 +19465,7 @@
       </p:sp>
       <p:pic>
         <p:nvPicPr>
-          <p:cNvPr id="439" name="" descr=""/>
+          <p:cNvPr id="443" name="" descr=""/>
           <p:cNvPicPr/>
           <p:nvPr/>
         </p:nvPicPr>
@@ -19454,7 +19488,7 @@
       </p:pic>
       <p:pic>
         <p:nvPicPr>
-          <p:cNvPr id="440" name="" descr=""/>
+          <p:cNvPr id="444" name="" descr=""/>
           <p:cNvPicPr/>
           <p:nvPr/>
         </p:nvPicPr>
@@ -19507,7 +19541,7 @@
       </p:grpSpPr>
       <p:sp>
         <p:nvSpPr>
-          <p:cNvPr id="441" name="CustomShape 1"/>
+          <p:cNvPr id="445" name="CustomShape 1"/>
           <p:cNvSpPr/>
           <p:nvPr/>
         </p:nvSpPr>
@@ -19554,7 +19588,7 @@
       </p:sp>
       <p:sp>
         <p:nvSpPr>
-          <p:cNvPr id="442" name="CustomShape 2"/>
+          <p:cNvPr id="446" name="CustomShape 2"/>
           <p:cNvSpPr/>
           <p:nvPr/>
         </p:nvSpPr>
@@ -19601,7 +19635,7 @@
       </p:sp>
       <p:sp>
         <p:nvSpPr>
-          <p:cNvPr id="443" name="CustomShape 3"/>
+          <p:cNvPr id="447" name="CustomShape 3"/>
           <p:cNvSpPr/>
           <p:nvPr/>
         </p:nvSpPr>
@@ -19648,7 +19682,7 @@
       </p:sp>
       <p:pic>
         <p:nvPicPr>
-          <p:cNvPr id="444" name="" descr=""/>
+          <p:cNvPr id="448" name="" descr=""/>
           <p:cNvPicPr/>
           <p:nvPr/>
         </p:nvPicPr>
@@ -19671,7 +19705,7 @@
       </p:pic>
       <p:pic>
         <p:nvPicPr>
-          <p:cNvPr id="445" name="" descr=""/>
+          <p:cNvPr id="449" name="" descr=""/>
           <p:cNvPicPr/>
           <p:nvPr/>
         </p:nvPicPr>
@@ -19784,8 +19818,8 @@
         </p:nvSpPr>
         <p:spPr>
           <a:xfrm>
-            <a:off x="1224000" y="1080000"/>
-            <a:ext cx="7600680" cy="3929400"/>
+            <a:off x="720000" y="792000"/>
+            <a:ext cx="8104680" cy="4217400"/>
           </a:xfrm>
           <a:prstGeom prst="rect">
             <a:avLst/>
@@ -19902,7 +19936,7 @@
                 <a:latin typeface="Arial"/>
                 <a:ea typeface="Noto Sans CJK SC"/>
               </a:rPr>
-              <a:t>- Dark theme / White text</a:t>
+              <a:t>- Dark theme / White text </a:t>
             </a:r>
             <a:endParaRPr b="0" lang="en-AU" sz="1800" spc="-1" strike="noStrike">
               <a:solidFill>
@@ -19970,6 +20004,46 @@
                 <a:spcPct val="100000"/>
               </a:lnSpc>
             </a:pPr>
+            <a:r>
+              <a:rPr b="0" lang="en-AU" sz="1800" spc="-1" strike="noStrike">
+                <a:solidFill>
+                  <a:srgbClr val="ffffff"/>
+                </a:solidFill>
+                <a:latin typeface="Arial"/>
+                <a:ea typeface="Noto Sans CJK SC"/>
+              </a:rPr>
+              <a:t>	</a:t>
+            </a:r>
+            <a:r>
+              <a:rPr b="0" lang="en-AU" sz="1800" spc="-1" strike="noStrike">
+                <a:solidFill>
+                  <a:srgbClr val="ffffff"/>
+                </a:solidFill>
+                <a:latin typeface="Arial"/>
+                <a:ea typeface="Noto Sans CJK SC"/>
+              </a:rPr>
+              <a:t>	</a:t>
+            </a:r>
+            <a:r>
+              <a:rPr b="0" lang="en-AU" sz="1800" spc="-1" strike="noStrike">
+                <a:solidFill>
+                  <a:srgbClr val="ffffff"/>
+                </a:solidFill>
+                <a:latin typeface="Arial"/>
+                <a:ea typeface="Noto Sans CJK SC"/>
+              </a:rPr>
+              <a:t>	</a:t>
+            </a:r>
+            <a:r>
+              <a:rPr b="0" lang="en-AU" sz="1800" spc="-1" strike="noStrike">
+                <a:solidFill>
+                  <a:srgbClr val="ffffff"/>
+                </a:solidFill>
+                <a:latin typeface="Arial"/>
+                <a:ea typeface="Noto Sans CJK SC"/>
+              </a:rPr>
+              <a:t>- Colours: </a:t>
+            </a:r>
             <a:endParaRPr b="0" lang="en-AU" sz="1800" spc="-1" strike="noStrike">
               <a:solidFill>
                 <a:srgbClr val="ffffff"/>
@@ -19983,6 +20057,36 @@
                 <a:spcPct val="100000"/>
               </a:lnSpc>
             </a:pPr>
+            <a:r>
+              <a:rPr b="0" lang="en-AU" sz="1800" spc="-1" strike="noStrike">
+                <a:solidFill>
+                  <a:srgbClr val="ffffff"/>
+                </a:solidFill>
+                <a:latin typeface="Arial"/>
+                <a:ea typeface="Noto Sans CJK SC"/>
+              </a:rPr>
+              <a:t>	</a:t>
+            </a:r>
+            <a:r>
+              <a:rPr b="0" lang="en-AU" sz="1800" spc="-1" strike="noStrike">
+                <a:solidFill>
+                  <a:srgbClr val="ffffff"/>
+                </a:solidFill>
+                <a:latin typeface="Arial"/>
+                <a:ea typeface="Noto Sans CJK SC"/>
+              </a:rPr>
+              <a:t>	</a:t>
+            </a:r>
+            <a:r>
+              <a:rPr b="0" lang="en-AU" sz="1800" spc="-1" strike="noStrike">
+                <a:solidFill>
+                  <a:srgbClr val="ffffff"/>
+                </a:solidFill>
+                <a:latin typeface="Arial"/>
+                <a:ea typeface="Noto Sans CJK SC"/>
+              </a:rPr>
+              <a:t>	</a:t>
+            </a:r>
             <a:endParaRPr b="0" lang="en-AU" sz="1800" spc="-1" strike="noStrike">
               <a:solidFill>
                 <a:srgbClr val="ffffff"/>
@@ -20004,7 +20108,7 @@
                 <a:latin typeface="Arial"/>
                 <a:ea typeface="Noto Sans CJK SC"/>
               </a:rPr>
-              <a:t>Content</a:t>
+              <a:t>	</a:t>
             </a:r>
             <a:r>
               <a:rPr b="0" lang="en-AU" sz="1800" spc="-1" strike="noStrike">
@@ -20034,7 +20138,17 @@
                 <a:latin typeface="Arial"/>
                 <a:ea typeface="Noto Sans CJK SC"/>
               </a:rPr>
-              <a:t>- Each page unique with display type of content</a:t>
+              <a:t>- Fonts: </a:t>
+            </a:r>
+            <a:r>
+              <a:rPr b="0" lang="en-AU" sz="1800" spc="-1" strike="noStrike">
+                <a:solidFill>
+                  <a:srgbClr val="ffffff"/>
+                </a:solidFill>
+                <a:latin typeface="Arial"/>
+                <a:ea typeface="Noto Sans CJK SC"/>
+              </a:rPr>
+              <a:t>	</a:t>
             </a:r>
             <a:endParaRPr b="0" lang="en-AU" sz="1800" spc="-1" strike="noStrike">
               <a:solidFill>
@@ -20049,46 +20163,6 @@
                 <a:spcPct val="100000"/>
               </a:lnSpc>
             </a:pPr>
-            <a:r>
-              <a:rPr b="0" lang="en-AU" sz="1800" spc="-1" strike="noStrike">
-                <a:solidFill>
-                  <a:srgbClr val="ffffff"/>
-                </a:solidFill>
-                <a:latin typeface="Arial"/>
-                <a:ea typeface="Noto Sans CJK SC"/>
-              </a:rPr>
-              <a:t>	</a:t>
-            </a:r>
-            <a:r>
-              <a:rPr b="0" lang="en-AU" sz="1800" spc="-1" strike="noStrike">
-                <a:solidFill>
-                  <a:srgbClr val="ffffff"/>
-                </a:solidFill>
-                <a:latin typeface="Arial"/>
-                <a:ea typeface="Noto Sans CJK SC"/>
-              </a:rPr>
-              <a:t>	</a:t>
-            </a:r>
-            <a:r>
-              <a:rPr b="0" lang="en-AU" sz="1800" spc="-1" strike="noStrike">
-                <a:solidFill>
-                  <a:srgbClr val="ffffff"/>
-                </a:solidFill>
-                <a:latin typeface="Arial"/>
-                <a:ea typeface="Noto Sans CJK SC"/>
-              </a:rPr>
-              <a:t>	</a:t>
-            </a:r>
-            <a:r>
-              <a:rPr b="0" lang="en-AU" sz="1800" spc="-1" strike="noStrike">
-                <a:solidFill>
-                  <a:srgbClr val="ffffff"/>
-                </a:solidFill>
-                <a:latin typeface="Arial"/>
-                <a:ea typeface="Noto Sans CJK SC"/>
-              </a:rPr>
-              <a:t>- Responsive (best I can get for now)</a:t>
-            </a:r>
             <a:endParaRPr b="0" lang="en-AU" sz="1800" spc="-1" strike="noStrike">
               <a:solidFill>
                 <a:srgbClr val="ffffff"/>
@@ -20102,6 +20176,46 @@
                 <a:spcPct val="100000"/>
               </a:lnSpc>
             </a:pPr>
+            <a:r>
+              <a:rPr b="0" lang="en-AU" sz="1800" spc="-1" strike="noStrike">
+                <a:solidFill>
+                  <a:srgbClr val="ffffff"/>
+                </a:solidFill>
+                <a:latin typeface="Arial"/>
+                <a:ea typeface="Noto Sans CJK SC"/>
+              </a:rPr>
+              <a:t>Content</a:t>
+            </a:r>
+            <a:r>
+              <a:rPr b="0" lang="en-AU" sz="1800" spc="-1" strike="noStrike">
+                <a:solidFill>
+                  <a:srgbClr val="ffffff"/>
+                </a:solidFill>
+                <a:latin typeface="Arial"/>
+                <a:ea typeface="Noto Sans CJK SC"/>
+              </a:rPr>
+              <a:t>	</a:t>
+            </a:r>
+            <a:r>
+              <a:rPr b="0" lang="en-AU" sz="1800" spc="-1" strike="noStrike">
+                <a:solidFill>
+                  <a:srgbClr val="ffffff"/>
+                </a:solidFill>
+                <a:latin typeface="Arial"/>
+                <a:ea typeface="Noto Sans CJK SC"/>
+              </a:rPr>
+              <a:t>	</a:t>
+            </a:r>
+            <a:r>
+              <a:rPr b="0" lang="en-AU" sz="1800" spc="-1" strike="noStrike">
+                <a:solidFill>
+                  <a:srgbClr val="ffffff"/>
+                </a:solidFill>
+                <a:latin typeface="Arial"/>
+                <a:ea typeface="Noto Sans CJK SC"/>
+              </a:rPr>
+              <a:t>- Each page unique with display type of content</a:t>
+            </a:r>
             <a:endParaRPr b="0" lang="en-AU" sz="1800" spc="-1" strike="noStrike">
               <a:solidFill>
                 <a:srgbClr val="ffffff"/>
@@ -20181,6 +20295,56 @@
                 <a:spcPct val="100000"/>
               </a:lnSpc>
             </a:pPr>
+            <a:r>
+              <a:rPr b="0" lang="en-AU" sz="1800" spc="-1" strike="noStrike">
+                <a:solidFill>
+                  <a:srgbClr val="ffffff"/>
+                </a:solidFill>
+                <a:latin typeface="Arial"/>
+                <a:ea typeface="Noto Sans CJK SC"/>
+              </a:rPr>
+              <a:t>	</a:t>
+            </a:r>
+            <a:r>
+              <a:rPr b="0" lang="en-AU" sz="1800" spc="-1" strike="noStrike">
+                <a:solidFill>
+                  <a:srgbClr val="ffffff"/>
+                </a:solidFill>
+                <a:latin typeface="Arial"/>
+                <a:ea typeface="Noto Sans CJK SC"/>
+              </a:rPr>
+              <a:t>	</a:t>
+            </a:r>
+            <a:r>
+              <a:rPr b="0" lang="en-AU" sz="1800" spc="-1" strike="noStrike">
+                <a:solidFill>
+                  <a:srgbClr val="ffffff"/>
+                </a:solidFill>
+                <a:latin typeface="Arial"/>
+                <a:ea typeface="Noto Sans CJK SC"/>
+              </a:rPr>
+              <a:t>	</a:t>
+            </a:r>
+            <a:r>
+              <a:rPr b="0" lang="en-AU" sz="1800" spc="-1" strike="noStrike">
+                <a:solidFill>
+                  <a:srgbClr val="ffffff"/>
+                </a:solidFill>
+                <a:latin typeface="Arial"/>
+                <a:ea typeface="Noto Sans CJK SC"/>
+              </a:rPr>
+              <a:t>- </a:t>
+            </a:r>
+            <a:r>
+              <a:rPr b="0" lang="en-AU" sz="1800" spc="-1" strike="noStrike">
+                <a:solidFill>
+                  <a:srgbClr val="ffffff"/>
+                </a:solidFill>
+                <a:latin typeface="Arial"/>
+                <a:ea typeface="Noto Sans CJK SC"/>
+              </a:rPr>
+              <a:t>Responsive across many screen sizes</a:t>
+            </a:r>
             <a:endParaRPr b="0" lang="en-AU" sz="1800" spc="-1" strike="noStrike">
               <a:solidFill>
                 <a:srgbClr val="ffffff"/>
@@ -20202,7 +20366,7 @@
                 <a:latin typeface="Arial"/>
                 <a:ea typeface="Noto Sans CJK SC"/>
               </a:rPr>
-              <a:t>Function</a:t>
+              <a:t>	</a:t>
             </a:r>
             <a:r>
               <a:rPr b="0" lang="en-AU" sz="1800" spc="-1" strike="noStrike">
@@ -20232,7 +20396,7 @@
                 <a:latin typeface="Arial"/>
                 <a:ea typeface="Noto Sans CJK SC"/>
               </a:rPr>
-              <a:t>- Some JavaScript and jQuery used:</a:t>
+              <a:t>- Use of both Grid &amp; Flexbox</a:t>
             </a:r>
             <a:endParaRPr b="0" lang="en-AU" sz="1800" spc="-1" strike="noStrike">
               <a:solidFill>
@@ -20247,56 +20411,6 @@
                 <a:spcPct val="100000"/>
               </a:lnSpc>
             </a:pPr>
-            <a:r>
-              <a:rPr b="0" lang="en-AU" sz="1800" spc="-1" strike="noStrike">
-                <a:solidFill>
-                  <a:srgbClr val="ffffff"/>
-                </a:solidFill>
-                <a:latin typeface="Arial"/>
-                <a:ea typeface="Noto Sans CJK SC"/>
-              </a:rPr>
-              <a:t>	</a:t>
-            </a:r>
-            <a:r>
-              <a:rPr b="0" lang="en-AU" sz="1800" spc="-1" strike="noStrike">
-                <a:solidFill>
-                  <a:srgbClr val="ffffff"/>
-                </a:solidFill>
-                <a:latin typeface="Arial"/>
-                <a:ea typeface="Noto Sans CJK SC"/>
-              </a:rPr>
-              <a:t>	</a:t>
-            </a:r>
-            <a:r>
-              <a:rPr b="0" lang="en-AU" sz="1800" spc="-1" strike="noStrike">
-                <a:solidFill>
-                  <a:srgbClr val="ffffff"/>
-                </a:solidFill>
-                <a:latin typeface="Arial"/>
-                <a:ea typeface="Noto Sans CJK SC"/>
-              </a:rPr>
-              <a:t>	</a:t>
-            </a:r>
-            <a:r>
-              <a:rPr b="0" lang="en-AU" sz="1800" spc="-1" strike="noStrike">
-                <a:solidFill>
-                  <a:srgbClr val="ffffff"/>
-                </a:solidFill>
-                <a:latin typeface="Arial"/>
-                <a:ea typeface="Noto Sans CJK SC"/>
-              </a:rPr>
-              <a:t>	</a:t>
-            </a:r>
-            <a:r>
-              <a:rPr b="0" lang="en-AU" sz="1800" spc="-1" strike="noStrike">
-                <a:solidFill>
-                  <a:srgbClr val="ffffff"/>
-                </a:solidFill>
-                <a:latin typeface="Arial"/>
-                <a:ea typeface="Noto Sans CJK SC"/>
-              </a:rPr>
-              <a:t>- Carousel and its Response</a:t>
-            </a:r>
             <a:endParaRPr b="0" lang="en-AU" sz="1800" spc="-1" strike="noStrike">
               <a:solidFill>
                 <a:srgbClr val="ffffff"/>
@@ -20318,7 +20432,7 @@
                 <a:latin typeface="Arial"/>
                 <a:ea typeface="Noto Sans CJK SC"/>
               </a:rPr>
-              <a:t>	</a:t>
+              <a:t>Function</a:t>
             </a:r>
             <a:r>
               <a:rPr b="0" lang="en-AU" sz="1800" spc="-1" strike="noStrike">
@@ -20348,17 +20462,7 @@
                 <a:latin typeface="Arial"/>
                 <a:ea typeface="Noto Sans CJK SC"/>
               </a:rPr>
-              <a:t>	</a:t>
-            </a:r>
-            <a:r>
-              <a:rPr b="0" lang="en-AU" sz="1800" spc="-1" strike="noStrike">
-                <a:solidFill>
-                  <a:srgbClr val="ffffff"/>
-                </a:solidFill>
-                <a:latin typeface="Arial"/>
-                <a:ea typeface="Noto Sans CJK SC"/>
-              </a:rPr>
-              <a:t>- Nav Toggle Collapse</a:t>
+              <a:t>- Some JavaScript &amp; jQuery library used:</a:t>
             </a:r>
             <a:endParaRPr b="0" lang="en-AU" sz="1800" spc="-1" strike="noStrike">
               <a:solidFill>
@@ -20403,6 +20507,26 @@
               </a:rPr>
               <a:t>	</a:t>
             </a:r>
+            <a:r>
+              <a:rPr b="0" lang="en-AU" sz="1800" spc="-1" strike="noStrike">
+                <a:solidFill>
+                  <a:srgbClr val="ffffff"/>
+                </a:solidFill>
+                <a:latin typeface="Arial"/>
+                <a:ea typeface="Noto Sans CJK SC"/>
+              </a:rPr>
+              <a:t>	</a:t>
+            </a:r>
+            <a:r>
+              <a:rPr b="0" lang="en-AU" sz="1800" spc="-1" strike="noStrike">
+                <a:solidFill>
+                  <a:srgbClr val="ffffff"/>
+                </a:solidFill>
+                <a:latin typeface="Arial"/>
+                <a:ea typeface="Noto Sans CJK SC"/>
+              </a:rPr>
+              <a:t>- Carousel inc. Response</a:t>
+            </a:r>
             <a:endParaRPr b="0" lang="en-AU" sz="1800" spc="-1" strike="noStrike">
               <a:solidFill>
                 <a:srgbClr val="ffffff"/>
@@ -20416,6 +20540,56 @@
                 <a:spcPct val="100000"/>
               </a:lnSpc>
             </a:pPr>
+            <a:r>
+              <a:rPr b="0" lang="en-AU" sz="1800" spc="-1" strike="noStrike">
+                <a:solidFill>
+                  <a:srgbClr val="ffffff"/>
+                </a:solidFill>
+                <a:latin typeface="Arial"/>
+                <a:ea typeface="Noto Sans CJK SC"/>
+              </a:rPr>
+              <a:t>	</a:t>
+            </a:r>
+            <a:r>
+              <a:rPr b="0" lang="en-AU" sz="1800" spc="-1" strike="noStrike">
+                <a:solidFill>
+                  <a:srgbClr val="ffffff"/>
+                </a:solidFill>
+                <a:latin typeface="Arial"/>
+                <a:ea typeface="Noto Sans CJK SC"/>
+              </a:rPr>
+              <a:t>	</a:t>
+            </a:r>
+            <a:r>
+              <a:rPr b="0" lang="en-AU" sz="1800" spc="-1" strike="noStrike">
+                <a:solidFill>
+                  <a:srgbClr val="ffffff"/>
+                </a:solidFill>
+                <a:latin typeface="Arial"/>
+                <a:ea typeface="Noto Sans CJK SC"/>
+              </a:rPr>
+              <a:t>	</a:t>
+            </a:r>
+            <a:r>
+              <a:rPr b="0" lang="en-AU" sz="1800" spc="-1" strike="noStrike">
+                <a:solidFill>
+                  <a:srgbClr val="ffffff"/>
+                </a:solidFill>
+                <a:latin typeface="Arial"/>
+                <a:ea typeface="Noto Sans CJK SC"/>
+              </a:rPr>
+              <a:t>	</a:t>
+            </a:r>
+            <a:r>
+              <a:rPr b="0" lang="en-AU" sz="1800" spc="-1" strike="noStrike">
+                <a:solidFill>
+                  <a:srgbClr val="ffffff"/>
+                </a:solidFill>
+                <a:latin typeface="Arial"/>
+                <a:ea typeface="Noto Sans CJK SC"/>
+              </a:rPr>
+              <a:t>- Nav BurgerMenu</a:t>
+            </a:r>
             <a:endParaRPr b="0" lang="en-AU" sz="1800" spc="-1" strike="noStrike">
               <a:solidFill>
                 <a:srgbClr val="ffffff"/>
@@ -20429,6 +20603,36 @@
                 <a:spcPct val="100000"/>
               </a:lnSpc>
             </a:pPr>
+            <a:r>
+              <a:rPr b="0" lang="en-AU" sz="1800" spc="-1" strike="noStrike">
+                <a:solidFill>
+                  <a:srgbClr val="ffffff"/>
+                </a:solidFill>
+                <a:latin typeface="Arial"/>
+                <a:ea typeface="Noto Sans CJK SC"/>
+              </a:rPr>
+              <a:t>	</a:t>
+            </a:r>
+            <a:r>
+              <a:rPr b="0" lang="en-AU" sz="1800" spc="-1" strike="noStrike">
+                <a:solidFill>
+                  <a:srgbClr val="ffffff"/>
+                </a:solidFill>
+                <a:latin typeface="Arial"/>
+                <a:ea typeface="Noto Sans CJK SC"/>
+              </a:rPr>
+              <a:t>	</a:t>
+            </a:r>
+            <a:r>
+              <a:rPr b="0" lang="en-AU" sz="1800" spc="-1" strike="noStrike">
+                <a:solidFill>
+                  <a:srgbClr val="ffffff"/>
+                </a:solidFill>
+                <a:latin typeface="Arial"/>
+                <a:ea typeface="Noto Sans CJK SC"/>
+              </a:rPr>
+              <a:t>	</a:t>
+            </a:r>
             <a:endParaRPr b="0" lang="en-AU" sz="1800" spc="-1" strike="noStrike">
               <a:solidFill>
                 <a:srgbClr val="ffffff"/>
@@ -20436,8 +20640,126 @@
               <a:latin typeface="Arial"/>
             </a:endParaRPr>
           </a:p>
-        </p:txBody>
-      </p:sp>
+          <a:p>
+            <a:pPr>
+              <a:lnSpc>
+                <a:spcPct val="100000"/>
+              </a:lnSpc>
+            </a:pPr>
+            <a:endParaRPr b="0" lang="en-AU" sz="1800" spc="-1" strike="noStrike">
+              <a:solidFill>
+                <a:srgbClr val="ffffff"/>
+              </a:solidFill>
+              <a:latin typeface="Arial"/>
+            </a:endParaRPr>
+          </a:p>
+          <a:p>
+            <a:pPr>
+              <a:lnSpc>
+                <a:spcPct val="100000"/>
+              </a:lnSpc>
+            </a:pPr>
+            <a:endParaRPr b="0" lang="en-AU" sz="1800" spc="-1" strike="noStrike">
+              <a:solidFill>
+                <a:srgbClr val="ffffff"/>
+              </a:solidFill>
+              <a:latin typeface="Arial"/>
+            </a:endParaRPr>
+          </a:p>
+        </p:txBody>
+      </p:sp>
+      <p:pic>
+        <p:nvPicPr>
+          <p:cNvPr id="317" name="" descr=""/>
+          <p:cNvPicPr/>
+          <p:nvPr/>
+        </p:nvPicPr>
+        <p:blipFill>
+          <a:blip r:embed="rId1"/>
+          <a:stretch/>
+        </p:blipFill>
+        <p:spPr>
+          <a:xfrm>
+            <a:off x="3168000" y="1728000"/>
+            <a:ext cx="6476400" cy="385200"/>
+          </a:xfrm>
+          <a:prstGeom prst="rect">
+            <a:avLst/>
+          </a:prstGeom>
+          <a:ln>
+            <a:noFill/>
+          </a:ln>
+        </p:spPr>
+      </p:pic>
+      <p:pic>
+        <p:nvPicPr>
+          <p:cNvPr id="318" name="" descr=""/>
+          <p:cNvPicPr/>
+          <p:nvPr/>
+        </p:nvPicPr>
+        <p:blipFill>
+          <a:blip r:embed="rId2"/>
+          <a:stretch/>
+        </p:blipFill>
+        <p:spPr>
+          <a:xfrm>
+            <a:off x="3110400" y="2232000"/>
+            <a:ext cx="921600" cy="360000"/>
+          </a:xfrm>
+          <a:prstGeom prst="rect">
+            <a:avLst/>
+          </a:prstGeom>
+          <a:ln>
+            <a:noFill/>
+          </a:ln>
+        </p:spPr>
+      </p:pic>
+      <p:pic>
+        <p:nvPicPr>
+          <p:cNvPr id="319" name="" descr=""/>
+          <p:cNvPicPr/>
+          <p:nvPr/>
+        </p:nvPicPr>
+        <p:blipFill>
+          <a:blip r:embed="rId3"/>
+          <a:stretch/>
+        </p:blipFill>
+        <p:spPr>
+          <a:xfrm>
+            <a:off x="4176000" y="2232000"/>
+            <a:ext cx="982800" cy="360000"/>
+          </a:xfrm>
+          <a:prstGeom prst="rect">
+            <a:avLst/>
+          </a:prstGeom>
+          <a:ln>
+            <a:noFill/>
+          </a:ln>
+        </p:spPr>
+      </p:pic>
+      <p:pic>
+        <p:nvPicPr>
+          <p:cNvPr id="320" name="" descr=""/>
+          <p:cNvPicPr/>
+          <p:nvPr/>
+        </p:nvPicPr>
+        <p:blipFill>
+          <a:blip r:embed="rId4"/>
+          <a:stretch/>
+        </p:blipFill>
+        <p:spPr>
+          <a:xfrm>
+            <a:off x="5342400" y="2232000"/>
+            <a:ext cx="2433600" cy="360000"/>
+          </a:xfrm>
+          <a:prstGeom prst="rect">
+            <a:avLst/>
+          </a:prstGeom>
+          <a:ln>
+            <a:noFill/>
+          </a:ln>
+        </p:spPr>
+      </p:pic>
     </p:spTree>
   </p:cSld>
   <mc:AlternateContent>
@@ -20470,7 +20792,7 @@
       </p:grpSpPr>
       <p:sp>
         <p:nvSpPr>
-          <p:cNvPr id="317" name="CustomShape 1"/>
+          <p:cNvPr id="321" name="CustomShape 1"/>
           <p:cNvSpPr/>
           <p:nvPr/>
         </p:nvSpPr>
@@ -20524,7 +20846,7 @@
       </p:sp>
       <p:pic>
         <p:nvPicPr>
-          <p:cNvPr id="318" name="" descr=""/>
+          <p:cNvPr id="322" name="" descr=""/>
           <p:cNvPicPr/>
           <p:nvPr/>
         </p:nvPicPr>
@@ -20547,7 +20869,7 @@
       </p:pic>
       <p:sp>
         <p:nvSpPr>
-          <p:cNvPr id="319" name="CustomShape 2"/>
+          <p:cNvPr id="323" name="CustomShape 2"/>
           <p:cNvSpPr/>
           <p:nvPr/>
         </p:nvSpPr>
@@ -20981,7 +21303,7 @@
       </p:grpSpPr>
       <p:sp>
         <p:nvSpPr>
-          <p:cNvPr id="320" name="CustomShape 1"/>
+          <p:cNvPr id="324" name="CustomShape 1"/>
           <p:cNvSpPr/>
           <p:nvPr/>
         </p:nvSpPr>
@@ -21035,7 +21357,7 @@
       </p:sp>
       <p:sp>
         <p:nvSpPr>
-          <p:cNvPr id="321" name="CustomShape 2"/>
+          <p:cNvPr id="325" name="CustomShape 2"/>
           <p:cNvSpPr/>
           <p:nvPr/>
         </p:nvSpPr>
@@ -21061,7 +21383,7 @@
       </p:sp>
       <p:sp>
         <p:nvSpPr>
-          <p:cNvPr id="322" name="CustomShape 3"/>
+          <p:cNvPr id="326" name="CustomShape 3"/>
           <p:cNvSpPr/>
           <p:nvPr/>
         </p:nvSpPr>
@@ -21087,7 +21409,7 @@
       </p:sp>
       <p:pic>
         <p:nvPicPr>
-          <p:cNvPr id="323" name="" descr=""/>
+          <p:cNvPr id="327" name="" descr=""/>
           <p:cNvPicPr/>
           <p:nvPr/>
         </p:nvPicPr>
@@ -21110,7 +21432,7 @@
       </p:pic>
       <p:sp>
         <p:nvSpPr>
-          <p:cNvPr id="324" name="CustomShape 4"/>
+          <p:cNvPr id="328" name="CustomShape 4"/>
           <p:cNvSpPr/>
           <p:nvPr/>
         </p:nvSpPr>
@@ -21645,7 +21967,7 @@
       </p:grpSpPr>
       <p:sp>
         <p:nvSpPr>
-          <p:cNvPr id="325" name="CustomShape 1"/>
+          <p:cNvPr id="329" name="CustomShape 1"/>
           <p:cNvSpPr/>
           <p:nvPr/>
         </p:nvSpPr>
@@ -21696,7 +22018,7 @@
       </p:sp>
       <p:sp>
         <p:nvSpPr>
-          <p:cNvPr id="326" name="CustomShape 2"/>
+          <p:cNvPr id="330" name="CustomShape 2"/>
           <p:cNvSpPr/>
           <p:nvPr/>
         </p:nvSpPr>
@@ -21722,7 +22044,7 @@
       </p:sp>
       <p:sp>
         <p:nvSpPr>
-          <p:cNvPr id="327" name="CustomShape 3"/>
+          <p:cNvPr id="331" name="CustomShape 3"/>
           <p:cNvSpPr/>
           <p:nvPr/>
         </p:nvSpPr>
@@ -21748,7 +22070,7 @@
       </p:sp>
       <p:pic>
         <p:nvPicPr>
-          <p:cNvPr id="328" name="" descr=""/>
+          <p:cNvPr id="332" name="" descr=""/>
           <p:cNvPicPr/>
           <p:nvPr/>
         </p:nvPicPr>
@@ -21771,7 +22093,7 @@
       </p:pic>
       <p:pic>
         <p:nvPicPr>
-          <p:cNvPr id="329" name="" descr=""/>
+          <p:cNvPr id="333" name="" descr=""/>
           <p:cNvPicPr/>
           <p:nvPr/>
         </p:nvPicPr>
@@ -21794,7 +22116,7 @@
       </p:pic>
       <p:sp>
         <p:nvSpPr>
-          <p:cNvPr id="330" name="CustomShape 4"/>
+          <p:cNvPr id="334" name="CustomShape 4"/>
           <p:cNvSpPr/>
           <p:nvPr/>
         </p:nvSpPr>
@@ -21848,7 +22170,7 @@
       </p:sp>
       <p:sp>
         <p:nvSpPr>
-          <p:cNvPr id="331" name="CustomShape 5"/>
+          <p:cNvPr id="335" name="CustomShape 5"/>
           <p:cNvSpPr/>
           <p:nvPr/>
         </p:nvSpPr>
@@ -21902,7 +22224,7 @@
       </p:sp>
       <p:sp>
         <p:nvSpPr>
-          <p:cNvPr id="332" name="CustomShape 6"/>
+          <p:cNvPr id="336" name="CustomShape 6"/>
           <p:cNvSpPr/>
           <p:nvPr/>
         </p:nvSpPr>
@@ -22255,7 +22577,7 @@
       </p:sp>
       <p:sp>
         <p:nvSpPr>
-          <p:cNvPr id="333" name="CustomShape 7"/>
+          <p:cNvPr id="337" name="CustomShape 7"/>
           <p:cNvSpPr/>
           <p:nvPr/>
         </p:nvSpPr>
@@ -22602,7 +22924,7 @@
       </p:grpSpPr>
       <p:sp>
         <p:nvSpPr>
-          <p:cNvPr id="334" name="CustomShape 1"/>
+          <p:cNvPr id="338" name="CustomShape 1"/>
           <p:cNvSpPr/>
           <p:nvPr/>
         </p:nvSpPr>
@@ -22653,7 +22975,7 @@
       </p:sp>
       <p:sp>
         <p:nvSpPr>
-          <p:cNvPr id="335" name="CustomShape 2"/>
+          <p:cNvPr id="339" name="CustomShape 2"/>
           <p:cNvSpPr/>
           <p:nvPr/>
         </p:nvSpPr>
@@ -22679,7 +23001,7 @@
       </p:sp>
       <p:sp>
         <p:nvSpPr>
-          <p:cNvPr id="336" name="CustomShape 3"/>
+          <p:cNvPr id="340" name="CustomShape 3"/>
           <p:cNvSpPr/>
           <p:nvPr/>
         </p:nvSpPr>
@@ -22705,7 +23027,7 @@
       </p:sp>
       <p:pic>
         <p:nvPicPr>
-          <p:cNvPr id="337" name="" descr=""/>
+          <p:cNvPr id="341" name="" descr=""/>
           <p:cNvPicPr/>
           <p:nvPr/>
         </p:nvPicPr>
@@ -22728,7 +23050,7 @@
       </p:pic>
       <p:sp>
         <p:nvSpPr>
-          <p:cNvPr id="338" name="CustomShape 4"/>
+          <p:cNvPr id="342" name="CustomShape 4"/>
           <p:cNvSpPr/>
           <p:nvPr/>
         </p:nvSpPr>
@@ -22770,6 +23092,49 @@
                 <a:ea typeface="DejaVu Sans"/>
               </a:rPr>
               <a:t>Components:</a:t>
+            </a:r>
+            <a:endParaRPr b="0" lang="en-AU" sz="1500" spc="-1" strike="noStrike">
+              <a:solidFill>
+                <a:srgbClr val="ffffff"/>
+              </a:solidFill>
+              <a:latin typeface="Arial"/>
+            </a:endParaRPr>
+          </a:p>
+          <a:p>
+            <a:pPr>
+              <a:lnSpc>
+                <a:spcPct val="100000"/>
+              </a:lnSpc>
+            </a:pPr>
+            <a:r>
+              <a:rPr b="0" lang="en-AU" sz="1500" spc="-1" strike="noStrike">
+                <a:solidFill>
+                  <a:srgbClr val="ffffff"/>
+                </a:solidFill>
+                <a:latin typeface="Arial"/>
+                <a:ea typeface="DejaVu Sans"/>
+              </a:rPr>
+              <a:t>	</a:t>
+            </a:r>
+            <a:r>
+              <a:rPr b="0" lang="en-AU" sz="1500" spc="-1" strike="noStrike">
+                <a:solidFill>
+                  <a:srgbClr val="ffffff"/>
+                </a:solidFill>
+                <a:latin typeface="Arial"/>
+                <a:ea typeface="DejaVu Sans"/>
+              </a:rPr>
+              <a:t>	</a:t>
+            </a:r>
+            <a:r>
+              <a:rPr b="0" lang="en-AU" sz="1500" spc="-1" strike="noStrike">
+                <a:solidFill>
+                  <a:srgbClr val="ffffff"/>
+                </a:solidFill>
+                <a:latin typeface="Arial"/>
+                <a:ea typeface="DejaVu Sans"/>
+              </a:rPr>
+              <a:t>JS + jQuery</a:t>
             </a:r>
             <a:endParaRPr b="0" lang="en-AU" sz="1500" spc="-1" strike="noStrike">
               <a:solidFill>
@@ -23197,7 +23562,7 @@
       </p:grpSpPr>
       <p:sp>
         <p:nvSpPr>
-          <p:cNvPr id="339" name="CustomShape 1"/>
+          <p:cNvPr id="343" name="CustomShape 1"/>
           <p:cNvSpPr/>
           <p:nvPr/>
         </p:nvSpPr>
@@ -23248,7 +23613,7 @@
       </p:sp>
       <p:sp>
         <p:nvSpPr>
-          <p:cNvPr id="340" name="CustomShape 2"/>
+          <p:cNvPr id="344" name="CustomShape 2"/>
           <p:cNvSpPr/>
           <p:nvPr/>
         </p:nvSpPr>
@@ -23274,7 +23639,7 @@
       </p:sp>
       <p:sp>
         <p:nvSpPr>
-          <p:cNvPr id="341" name="CustomShape 3"/>
+          <p:cNvPr id="345" name="CustomShape 3"/>
           <p:cNvSpPr/>
           <p:nvPr/>
         </p:nvSpPr>
@@ -23300,7 +23665,7 @@
       </p:sp>
       <p:pic>
         <p:nvPicPr>
-          <p:cNvPr id="342" name="" descr=""/>
+          <p:cNvPr id="346" name="" descr=""/>
           <p:cNvPicPr/>
           <p:nvPr/>
         </p:nvPicPr>
@@ -23323,7 +23688,7 @@
       </p:pic>
       <p:pic>
         <p:nvPicPr>
-          <p:cNvPr id="343" name="" descr=""/>
+          <p:cNvPr id="347" name="" descr=""/>
           <p:cNvPicPr/>
           <p:nvPr/>
         </p:nvPicPr>
@@ -23346,7 +23711,7 @@
       </p:pic>
       <p:sp>
         <p:nvSpPr>
-          <p:cNvPr id="344" name="CustomShape 4"/>
+          <p:cNvPr id="348" name="CustomShape 4"/>
           <p:cNvSpPr/>
           <p:nvPr/>
         </p:nvSpPr>
@@ -23537,7 +23902,7 @@
       </p:sp>
       <p:sp>
         <p:nvSpPr>
-          <p:cNvPr id="345" name="CustomShape 5"/>
+          <p:cNvPr id="349" name="CustomShape 5"/>
           <p:cNvSpPr/>
           <p:nvPr/>
         </p:nvSpPr>
@@ -23706,7 +24071,7 @@
       </p:grpSpPr>
       <p:sp>
         <p:nvSpPr>
-          <p:cNvPr id="346" name="CustomShape 1"/>
+          <p:cNvPr id="350" name="CustomShape 1"/>
           <p:cNvSpPr/>
           <p:nvPr/>
         </p:nvSpPr>
@@ -23757,7 +24122,7 @@
       </p:sp>
       <p:sp>
         <p:nvSpPr>
-          <p:cNvPr id="347" name="CustomShape 2"/>
+          <p:cNvPr id="351" name="CustomShape 2"/>
           <p:cNvSpPr/>
           <p:nvPr/>
         </p:nvSpPr>
@@ -23783,7 +24148,7 @@
       </p:sp>
       <p:sp>
         <p:nvSpPr>
-          <p:cNvPr id="348" name="CustomShape 3"/>
+          <p:cNvPr id="352" name="CustomShape 3"/>
           <p:cNvSpPr/>
           <p:nvPr/>
         </p:nvSpPr>
@@ -23809,7 +24174,7 @@
       </p:sp>
       <p:pic>
         <p:nvPicPr>
-          <p:cNvPr id="349" name="" descr=""/>
+          <p:cNvPr id="353" name="" descr=""/>
           <p:cNvPicPr/>
           <p:nvPr/>
         </p:nvPicPr>
@@ -23832,7 +24197,7 @@
       </p:pic>
       <p:sp>
         <p:nvSpPr>
-          <p:cNvPr id="350" name="CustomShape 4"/>
+          <p:cNvPr id="354" name="CustomShape 4"/>
           <p:cNvSpPr/>
           <p:nvPr/>
         </p:nvSpPr>
@@ -23858,7 +24223,7 @@
       </p:sp>
       <p:sp>
         <p:nvSpPr>
-          <p:cNvPr id="351" name="CustomShape 5"/>
+          <p:cNvPr id="355" name="CustomShape 5"/>
           <p:cNvSpPr/>
           <p:nvPr/>
         </p:nvSpPr>
@@ -23891,11 +24256,31 @@
                 <a:spcPct val="100000"/>
               </a:lnSpc>
             </a:pPr>
+            <a:endParaRPr b="0" lang="en-AU" sz="1800" spc="-1" strike="noStrike">
+              <a:latin typeface="Arial"/>
+            </a:endParaRPr>
+          </a:p>
+          <a:p>
+            <a:pPr>
+              <a:lnSpc>
+                <a:spcPct val="100000"/>
+              </a:lnSpc>
+            </a:pPr>
+            <a:endParaRPr b="0" lang="en-AU" sz="1800" spc="-1" strike="noStrike">
+              <a:latin typeface="Arial"/>
+            </a:endParaRPr>
+          </a:p>
+          <a:p>
+            <a:pPr>
+              <a:lnSpc>
+                <a:spcPct val="100000"/>
+              </a:lnSpc>
+            </a:pPr>
             <a:r>
               <a:rPr b="0" lang="en-AU" sz="1500" spc="-1" strike="noStrike">
                 <a:latin typeface="Arial"/>
               </a:rPr>
-              <a:t>Components:</a:t>
+              <a:t>Display:</a:t>
             </a:r>
             <a:endParaRPr b="0" lang="en-AU" sz="1500" spc="-1" strike="noStrike">
               <a:latin typeface="Arial"/>
@@ -23907,6 +24292,18 @@
                 <a:spcPct val="100000"/>
               </a:lnSpc>
             </a:pPr>
+            <a:r>
+              <a:rPr b="0" lang="en-AU" sz="1500" spc="-1" strike="noStrike">
+                <a:latin typeface="Arial"/>
+              </a:rPr>
+              <a:t>	</a:t>
+            </a:r>
+            <a:r>
+              <a:rPr b="0" lang="en-AU" sz="1500" spc="-1" strike="noStrike">
+                <a:latin typeface="Arial"/>
+              </a:rPr>
+              <a:t>Grid template columns</a:t>
+            </a:r>
             <a:endParaRPr b="0" lang="en-AU" sz="1500" spc="-1" strike="noStrike">
               <a:latin typeface="Arial"/>
             </a:endParaRPr>
@@ -23921,7 +24318,13 @@
               <a:rPr b="0" lang="en-AU" sz="1500" spc="-1" strike="noStrike">
                 <a:latin typeface="Arial"/>
               </a:rPr>
-              <a:t>Display:</a:t>
+              <a:t>	</a:t>
+            </a:r>
+            <a:r>
+              <a:rPr b="0" lang="en-AU" sz="1500" spc="-1" strike="noStrike">
+                <a:latin typeface="Arial"/>
+              </a:rPr>
+              <a:t>70% Main Content / 30% Sidebar</a:t>
             </a:r>
             <a:endParaRPr b="0" lang="en-AU" sz="1500" spc="-1" strike="noStrike">
               <a:latin typeface="Arial"/>
@@ -23943,7 +24346,7 @@
               <a:rPr b="0" lang="en-AU" sz="1500" spc="-1" strike="noStrike">
                 <a:latin typeface="Arial"/>
               </a:rPr>
-              <a:t>Grid template columns</a:t>
+              <a:t>5 blogs per page</a:t>
             </a:r>
             <a:endParaRPr b="0" lang="en-AU" sz="1500" spc="-1" strike="noStrike">
               <a:latin typeface="Arial"/>
@@ -23955,17 +24358,43 @@
                 <a:spcPct val="100000"/>
               </a:lnSpc>
             </a:pPr>
+            <a:endParaRPr b="0" lang="en-AU" sz="1500" spc="-1" strike="noStrike">
+              <a:latin typeface="Arial"/>
+            </a:endParaRPr>
+          </a:p>
+          <a:p>
+            <a:pPr>
+              <a:lnSpc>
+                <a:spcPct val="100000"/>
+              </a:lnSpc>
+            </a:pPr>
             <a:r>
               <a:rPr b="0" lang="en-AU" sz="1500" spc="-1" strike="noStrike">
                 <a:latin typeface="Arial"/>
               </a:rPr>
+              <a:t>Content: </a:t>
+            </a:r>
+            <a:endParaRPr b="0" lang="en-AU" sz="1500" spc="-1" strike="noStrike">
+              <a:latin typeface="Arial"/>
+            </a:endParaRPr>
+          </a:p>
+          <a:p>
+            <a:pPr>
+              <a:lnSpc>
+                <a:spcPct val="100000"/>
+              </a:lnSpc>
+            </a:pPr>
+            <a:r>
+              <a:rPr b="0" lang="en-AU" sz="1500" spc="-1" strike="noStrike">
+                <a:latin typeface="Arial"/>
+              </a:rPr>
               <a:t>	</a:t>
             </a:r>
             <a:r>
               <a:rPr b="0" lang="en-AU" sz="1500" spc="-1" strike="noStrike">
                 <a:latin typeface="Arial"/>
               </a:rPr>
-              <a:t>70% Main Content / 30% Sidebar</a:t>
+              <a:t>Main:</a:t>
             </a:r>
             <a:endParaRPr b="0" lang="en-AU" sz="1500" spc="-1" strike="noStrike">
               <a:latin typeface="Arial"/>
@@ -23987,7 +24416,13 @@
               <a:rPr b="0" lang="en-AU" sz="1500" spc="-1" strike="noStrike">
                 <a:latin typeface="Arial"/>
               </a:rPr>
-              <a:t>5 blogs per page</a:t>
+              <a:t>	</a:t>
+            </a:r>
+            <a:r>
+              <a:rPr b="0" lang="en-AU" sz="1500" spc="-1" strike="noStrike">
+                <a:latin typeface="Arial"/>
+              </a:rPr>
+              <a:t>Linux, Git, HTML, CSS, WebDev</a:t>
             </a:r>
             <a:endParaRPr b="0" lang="en-AU" sz="1500" spc="-1" strike="noStrike">
               <a:latin typeface="Arial"/>
@@ -23999,6 +24434,18 @@
                 <a:spcPct val="100000"/>
               </a:lnSpc>
             </a:pPr>
+            <a:r>
+              <a:rPr b="0" lang="en-AU" sz="1500" spc="-1" strike="noStrike">
+                <a:latin typeface="Arial"/>
+              </a:rPr>
+              <a:t>	</a:t>
+            </a:r>
+            <a:r>
+              <a:rPr b="0" lang="en-AU" sz="1500" spc="-1" strike="noStrike">
+                <a:latin typeface="Arial"/>
+              </a:rPr>
+              <a:t>Sidebar:</a:t>
+            </a:r>
             <a:endParaRPr b="0" lang="en-AU" sz="1500" spc="-1" strike="noStrike">
               <a:latin typeface="Arial"/>
             </a:endParaRPr>
@@ -24013,18 +24460,8 @@
               <a:rPr b="0" lang="en-AU" sz="1500" spc="-1" strike="noStrike">
                 <a:latin typeface="Arial"/>
               </a:rPr>
-              <a:t>Content: </a:t>
-            </a:r>
-            <a:endParaRPr b="0" lang="en-AU" sz="1500" spc="-1" strike="noStrike">
-              <a:latin typeface="Arial"/>
-            </a:endParaRPr>
-          </a:p>
-          <a:p>
-            <a:pPr>
-              <a:lnSpc>
-                <a:spcPct val="100000"/>
-              </a:lnSpc>
-            </a:pPr>
+              <a:t>	</a:t>
+            </a:r>
             <a:r>
               <a:rPr b="0" lang="en-AU" sz="1500" spc="-1" strike="noStrike">
                 <a:latin typeface="Arial"/>
@@ -24035,85 +24472,7 @@
               <a:rPr b="0" lang="en-AU" sz="1500" spc="-1" strike="noStrike">
                 <a:latin typeface="Arial"/>
               </a:rPr>
-              <a:t>Main:</a:t>
-            </a:r>
-            <a:endParaRPr b="0" lang="en-AU" sz="1500" spc="-1" strike="noStrike">
-              <a:latin typeface="Arial"/>
-            </a:endParaRPr>
-          </a:p>
-          <a:p>
-            <a:pPr>
-              <a:lnSpc>
-                <a:spcPct val="100000"/>
-              </a:lnSpc>
-            </a:pPr>
-            <a:r>
-              <a:rPr b="0" lang="en-AU" sz="1500" spc="-1" strike="noStrike">
-                <a:latin typeface="Arial"/>
-              </a:rPr>
-              <a:t>	</a:t>
-            </a:r>
-            <a:r>
-              <a:rPr b="0" lang="en-AU" sz="1500" spc="-1" strike="noStrike">
-                <a:latin typeface="Arial"/>
-              </a:rPr>
-              <a:t>	</a:t>
-            </a:r>
-            <a:r>
-              <a:rPr b="0" lang="en-AU" sz="1500" spc="-1" strike="noStrike">
-                <a:latin typeface="Arial"/>
-              </a:rPr>
-              <a:t>Linux, Git, HTML, CSS, WebDev</a:t>
-            </a:r>
-            <a:endParaRPr b="0" lang="en-AU" sz="1500" spc="-1" strike="noStrike">
-              <a:latin typeface="Arial"/>
-            </a:endParaRPr>
-          </a:p>
-          <a:p>
-            <a:pPr>
-              <a:lnSpc>
-                <a:spcPct val="100000"/>
-              </a:lnSpc>
-            </a:pPr>
-            <a:r>
-              <a:rPr b="0" lang="en-AU" sz="1500" spc="-1" strike="noStrike">
-                <a:latin typeface="Arial"/>
-              </a:rPr>
-              <a:t>	</a:t>
-            </a:r>
-            <a:r>
-              <a:rPr b="0" lang="en-AU" sz="1500" spc="-1" strike="noStrike">
-                <a:latin typeface="Arial"/>
-              </a:rPr>
-              <a:t>Side:</a:t>
-            </a:r>
-            <a:endParaRPr b="0" lang="en-AU" sz="1500" spc="-1" strike="noStrike">
-              <a:latin typeface="Arial"/>
-            </a:endParaRPr>
-          </a:p>
-          <a:p>
-            <a:pPr>
-              <a:lnSpc>
-                <a:spcPct val="100000"/>
-              </a:lnSpc>
-            </a:pPr>
-            <a:r>
-              <a:rPr b="0" lang="en-AU" sz="1500" spc="-1" strike="noStrike">
-                <a:latin typeface="Arial"/>
-              </a:rPr>
-              <a:t>	</a:t>
-            </a:r>
-            <a:r>
-              <a:rPr b="0" lang="en-AU" sz="1500" spc="-1" strike="noStrike">
-                <a:latin typeface="Arial"/>
-              </a:rPr>
-              <a:t>	</a:t>
-            </a:r>
-            <a:r>
-              <a:rPr b="0" lang="en-AU" sz="1500" spc="-1" strike="noStrike">
-                <a:latin typeface="Arial"/>
-              </a:rPr>
-              <a:t>Category/Blog nav</a:t>
+              <a:t>Category/Blog Nav</a:t>
             </a:r>
             <a:endParaRPr b="0" lang="en-AU" sz="1500" spc="-1" strike="noStrike">
               <a:latin typeface="Arial"/>

</xml_diff>